<commit_message>
Atualizar o conteudo completo
</commit_message>
<xml_diff>
--- a/projeto-site/public/documentação/Apresentação1.pptx
+++ b/projeto-site/public/documentação/Apresentação1.pptx
@@ -10,9 +10,12 @@
     <p:sldId id="258" r:id="rId4"/>
     <p:sldId id="259" r:id="rId5"/>
     <p:sldId id="260" r:id="rId6"/>
-    <p:sldId id="263" r:id="rId7"/>
-    <p:sldId id="262" r:id="rId8"/>
-    <p:sldId id="261" r:id="rId9"/>
+    <p:sldId id="265" r:id="rId7"/>
+    <p:sldId id="263" r:id="rId8"/>
+    <p:sldId id="262" r:id="rId9"/>
+    <p:sldId id="266" r:id="rId10"/>
+    <p:sldId id="261" r:id="rId11"/>
+    <p:sldId id="264" r:id="rId12"/>
   </p:sldIdLst>
   <p:sldSz cx="12192000" cy="6858000"/>
   <p:notesSz cx="6858000" cy="9144000"/>
@@ -111,6 +114,11 @@
       </a:defRPr>
     </a:lvl9pPr>
   </p:defaultTextStyle>
+  <p:extLst>
+    <p:ext uri="{EFAFB233-063F-42B5-8137-9DF3F51BA10A}">
+      <p15:sldGuideLst xmlns:p15="http://schemas.microsoft.com/office/powerpoint/2012/main"/>
+    </p:ext>
+  </p:extLst>
 </p:presentation>
 </file>
 
@@ -261,7 +269,7 @@
           <a:p>
             <a:fld id="{DADCBE56-830C-4B6F-BC64-2BBE2C49ED9B}" type="datetimeFigureOut">
               <a:rPr lang="pt-BR" smtClean="0"/>
-              <a:t>01/12/2020</a:t>
+              <a:t>02/12/2020</a:t>
             </a:fld>
             <a:endParaRPr lang="pt-BR"/>
           </a:p>
@@ -459,7 +467,7 @@
           <a:p>
             <a:fld id="{DADCBE56-830C-4B6F-BC64-2BBE2C49ED9B}" type="datetimeFigureOut">
               <a:rPr lang="pt-BR" smtClean="0"/>
-              <a:t>01/12/2020</a:t>
+              <a:t>02/12/2020</a:t>
             </a:fld>
             <a:endParaRPr lang="pt-BR"/>
           </a:p>
@@ -667,7 +675,7 @@
           <a:p>
             <a:fld id="{DADCBE56-830C-4B6F-BC64-2BBE2C49ED9B}" type="datetimeFigureOut">
               <a:rPr lang="pt-BR" smtClean="0"/>
-              <a:t>01/12/2020</a:t>
+              <a:t>02/12/2020</a:t>
             </a:fld>
             <a:endParaRPr lang="pt-BR"/>
           </a:p>
@@ -865,7 +873,7 @@
           <a:p>
             <a:fld id="{DADCBE56-830C-4B6F-BC64-2BBE2C49ED9B}" type="datetimeFigureOut">
               <a:rPr lang="pt-BR" smtClean="0"/>
-              <a:t>01/12/2020</a:t>
+              <a:t>02/12/2020</a:t>
             </a:fld>
             <a:endParaRPr lang="pt-BR"/>
           </a:p>
@@ -1140,7 +1148,7 @@
           <a:p>
             <a:fld id="{DADCBE56-830C-4B6F-BC64-2BBE2C49ED9B}" type="datetimeFigureOut">
               <a:rPr lang="pt-BR" smtClean="0"/>
-              <a:t>01/12/2020</a:t>
+              <a:t>02/12/2020</a:t>
             </a:fld>
             <a:endParaRPr lang="pt-BR"/>
           </a:p>
@@ -1405,7 +1413,7 @@
           <a:p>
             <a:fld id="{DADCBE56-830C-4B6F-BC64-2BBE2C49ED9B}" type="datetimeFigureOut">
               <a:rPr lang="pt-BR" smtClean="0"/>
-              <a:t>01/12/2020</a:t>
+              <a:t>02/12/2020</a:t>
             </a:fld>
             <a:endParaRPr lang="pt-BR"/>
           </a:p>
@@ -1817,7 +1825,7 @@
           <a:p>
             <a:fld id="{DADCBE56-830C-4B6F-BC64-2BBE2C49ED9B}" type="datetimeFigureOut">
               <a:rPr lang="pt-BR" smtClean="0"/>
-              <a:t>01/12/2020</a:t>
+              <a:t>02/12/2020</a:t>
             </a:fld>
             <a:endParaRPr lang="pt-BR"/>
           </a:p>
@@ -1958,7 +1966,7 @@
           <a:p>
             <a:fld id="{DADCBE56-830C-4B6F-BC64-2BBE2C49ED9B}" type="datetimeFigureOut">
               <a:rPr lang="pt-BR" smtClean="0"/>
-              <a:t>01/12/2020</a:t>
+              <a:t>02/12/2020</a:t>
             </a:fld>
             <a:endParaRPr lang="pt-BR"/>
           </a:p>
@@ -2071,7 +2079,7 @@
           <a:p>
             <a:fld id="{DADCBE56-830C-4B6F-BC64-2BBE2C49ED9B}" type="datetimeFigureOut">
               <a:rPr lang="pt-BR" smtClean="0"/>
-              <a:t>01/12/2020</a:t>
+              <a:t>02/12/2020</a:t>
             </a:fld>
             <a:endParaRPr lang="pt-BR"/>
           </a:p>
@@ -2382,7 +2390,7 @@
           <a:p>
             <a:fld id="{DADCBE56-830C-4B6F-BC64-2BBE2C49ED9B}" type="datetimeFigureOut">
               <a:rPr lang="pt-BR" smtClean="0"/>
-              <a:t>01/12/2020</a:t>
+              <a:t>02/12/2020</a:t>
             </a:fld>
             <a:endParaRPr lang="pt-BR"/>
           </a:p>
@@ -2670,7 +2678,7 @@
           <a:p>
             <a:fld id="{DADCBE56-830C-4B6F-BC64-2BBE2C49ED9B}" type="datetimeFigureOut">
               <a:rPr lang="pt-BR" smtClean="0"/>
-              <a:t>01/12/2020</a:t>
+              <a:t>02/12/2020</a:t>
             </a:fld>
             <a:endParaRPr lang="pt-BR"/>
           </a:p>
@@ -2911,7 +2919,7 @@
           <a:p>
             <a:fld id="{DADCBE56-830C-4B6F-BC64-2BBE2C49ED9B}" type="datetimeFigureOut">
               <a:rPr lang="pt-BR" smtClean="0"/>
-              <a:t>01/12/2020</a:t>
+              <a:t>02/12/2020</a:t>
             </a:fld>
             <a:endParaRPr lang="pt-BR"/>
           </a:p>
@@ -3614,6 +3622,571 @@
 </p:sld>
 </file>
 
+<file path=ppt/slides/slide10.xml><?xml version="1.0" encoding="utf-8"?>
+<p:sld xmlns:a="http://schemas.openxmlformats.org/drawingml/2006/main" xmlns:r="http://schemas.openxmlformats.org/officeDocument/2006/relationships" xmlns:p="http://schemas.openxmlformats.org/presentationml/2006/main">
+  <p:cSld>
+    <p:bg>
+      <p:bgPr>
+        <a:blipFill dpi="0" rotWithShape="1">
+          <a:blip r:embed="rId2">
+            <a:alphaModFix amt="95000"/>
+            <a:lum/>
+          </a:blip>
+          <a:srcRect/>
+          <a:stretch>
+            <a:fillRect/>
+          </a:stretch>
+        </a:blipFill>
+        <a:effectLst/>
+      </p:bgPr>
+    </p:bg>
+    <p:spTree>
+      <p:nvGrpSpPr>
+        <p:cNvPr id="1" name=""/>
+        <p:cNvGrpSpPr/>
+        <p:nvPr/>
+      </p:nvGrpSpPr>
+      <p:grpSpPr>
+        <a:xfrm>
+          <a:off x="0" y="0"/>
+          <a:ext cx="0" cy="0"/>
+          <a:chOff x="0" y="0"/>
+          <a:chExt cx="0" cy="0"/>
+        </a:xfrm>
+      </p:grpSpPr>
+      <p:sp>
+        <p:nvSpPr>
+          <p:cNvPr id="2" name="Pentágono 1">
+            <a:extLst>
+              <a:ext uri="{FF2B5EF4-FFF2-40B4-BE49-F238E27FC236}">
+                <a16:creationId xmlns:a16="http://schemas.microsoft.com/office/drawing/2014/main" id="{79FAE24A-9C72-4019-9BC3-3B905246E79E}"/>
+              </a:ext>
+            </a:extLst>
+          </p:cNvPr>
+          <p:cNvSpPr/>
+          <p:nvPr/>
+        </p:nvSpPr>
+        <p:spPr>
+          <a:xfrm>
+            <a:off x="918027" y="-1407886"/>
+            <a:ext cx="10355943" cy="8265886"/>
+          </a:xfrm>
+          <a:prstGeom prst="pentagon">
+            <a:avLst/>
+          </a:prstGeom>
+          <a:pattFill prst="weave">
+            <a:fgClr>
+              <a:srgbClr val="213216"/>
+            </a:fgClr>
+            <a:bgClr>
+              <a:srgbClr val="0E1509"/>
+            </a:bgClr>
+          </a:pattFill>
+          <a:ln>
+            <a:solidFill>
+              <a:schemeClr val="accent6">
+                <a:lumMod val="75000"/>
+              </a:schemeClr>
+            </a:solidFill>
+          </a:ln>
+        </p:spPr>
+        <p:style>
+          <a:lnRef idx="2">
+            <a:schemeClr val="accent1">
+              <a:shade val="50000"/>
+            </a:schemeClr>
+          </a:lnRef>
+          <a:fillRef idx="1">
+            <a:schemeClr val="accent1"/>
+          </a:fillRef>
+          <a:effectRef idx="0">
+            <a:schemeClr val="accent1"/>
+          </a:effectRef>
+          <a:fontRef idx="minor">
+            <a:schemeClr val="lt1"/>
+          </a:fontRef>
+        </p:style>
+        <p:txBody>
+          <a:bodyPr rtlCol="0" anchor="ctr"/>
+          <a:lstStyle/>
+          <a:p>
+            <a:pPr algn="ctr"/>
+            <a:endParaRPr lang="pt-BR"/>
+          </a:p>
+        </p:txBody>
+      </p:sp>
+      <p:sp>
+        <p:nvSpPr>
+          <p:cNvPr id="5" name="Retângulo 4">
+            <a:extLst>
+              <a:ext uri="{FF2B5EF4-FFF2-40B4-BE49-F238E27FC236}">
+                <a16:creationId xmlns:a16="http://schemas.microsoft.com/office/drawing/2014/main" id="{E99CD1D1-1AE0-4608-B8CE-F8DDF8DA8308}"/>
+              </a:ext>
+            </a:extLst>
+          </p:cNvPr>
+          <p:cNvSpPr/>
+          <p:nvPr/>
+        </p:nvSpPr>
+        <p:spPr>
+          <a:xfrm>
+            <a:off x="4332514" y="1298599"/>
+            <a:ext cx="3526971" cy="2427514"/>
+          </a:xfrm>
+          <a:prstGeom prst="rect">
+            <a:avLst/>
+          </a:prstGeom>
+          <a:solidFill>
+            <a:schemeClr val="tx1">
+              <a:lumMod val="95000"/>
+              <a:lumOff val="5000"/>
+            </a:schemeClr>
+          </a:solidFill>
+          <a:ln w="28575">
+            <a:solidFill>
+              <a:schemeClr val="accent6">
+                <a:lumMod val="75000"/>
+              </a:schemeClr>
+            </a:solidFill>
+          </a:ln>
+        </p:spPr>
+        <p:style>
+          <a:lnRef idx="2">
+            <a:schemeClr val="accent1">
+              <a:shade val="50000"/>
+            </a:schemeClr>
+          </a:lnRef>
+          <a:fillRef idx="1">
+            <a:schemeClr val="accent1"/>
+          </a:fillRef>
+          <a:effectRef idx="0">
+            <a:schemeClr val="accent1"/>
+          </a:effectRef>
+          <a:fontRef idx="minor">
+            <a:schemeClr val="lt1"/>
+          </a:fontRef>
+        </p:style>
+        <p:txBody>
+          <a:bodyPr rtlCol="0" anchor="ctr"/>
+          <a:lstStyle/>
+          <a:p>
+            <a:pPr algn="ctr"/>
+            <a:endParaRPr lang="pt-BR"/>
+          </a:p>
+        </p:txBody>
+      </p:sp>
+      <p:sp>
+        <p:nvSpPr>
+          <p:cNvPr id="3" name="CaixaDeTexto 2">
+            <a:extLst>
+              <a:ext uri="{FF2B5EF4-FFF2-40B4-BE49-F238E27FC236}">
+                <a16:creationId xmlns:a16="http://schemas.microsoft.com/office/drawing/2014/main" id="{A4343107-DB34-4D7C-ADDC-CB26112FD097}"/>
+              </a:ext>
+            </a:extLst>
+          </p:cNvPr>
+          <p:cNvSpPr txBox="1"/>
+          <p:nvPr/>
+        </p:nvSpPr>
+        <p:spPr>
+          <a:xfrm>
+            <a:off x="4528704" y="1429227"/>
+            <a:ext cx="3207160" cy="630942"/>
+          </a:xfrm>
+          <a:prstGeom prst="rect">
+            <a:avLst/>
+          </a:prstGeom>
+          <a:noFill/>
+        </p:spPr>
+        <p:txBody>
+          <a:bodyPr wrap="none" rtlCol="0">
+            <a:spAutoFit/>
+          </a:bodyPr>
+          <a:lstStyle/>
+          <a:p>
+            <a:r>
+              <a:rPr lang="pt-BR" sz="3500" b="1" dirty="0">
+                <a:solidFill>
+                  <a:schemeClr val="accent6">
+                    <a:lumMod val="75000"/>
+                  </a:schemeClr>
+                </a:solidFill>
+                <a:latin typeface="Exo 2"/>
+              </a:rPr>
+              <a:t>Agradecimentos</a:t>
+            </a:r>
+          </a:p>
+        </p:txBody>
+      </p:sp>
+      <p:sp>
+        <p:nvSpPr>
+          <p:cNvPr id="4" name="CaixaDeTexto 3">
+            <a:extLst>
+              <a:ext uri="{FF2B5EF4-FFF2-40B4-BE49-F238E27FC236}">
+                <a16:creationId xmlns:a16="http://schemas.microsoft.com/office/drawing/2014/main" id="{EAEF0CD5-E7CF-4EB9-820A-E695EF7EC2B1}"/>
+              </a:ext>
+            </a:extLst>
+          </p:cNvPr>
+          <p:cNvSpPr txBox="1"/>
+          <p:nvPr/>
+        </p:nvSpPr>
+        <p:spPr>
+          <a:xfrm>
+            <a:off x="4528704" y="2060169"/>
+            <a:ext cx="2923749" cy="1569660"/>
+          </a:xfrm>
+          <a:prstGeom prst="rect">
+            <a:avLst/>
+          </a:prstGeom>
+          <a:noFill/>
+        </p:spPr>
+        <p:txBody>
+          <a:bodyPr wrap="none" rtlCol="0">
+            <a:spAutoFit/>
+          </a:bodyPr>
+          <a:lstStyle/>
+          <a:p>
+            <a:pPr marL="457200" indent="-457200">
+              <a:buFont typeface="Arial" panose="020B0604020202020204" pitchFamily="34" charset="0"/>
+              <a:buChar char="•"/>
+            </a:pPr>
+            <a:r>
+              <a:rPr lang="pt-BR" sz="2400" b="1" dirty="0">
+                <a:solidFill>
+                  <a:schemeClr val="bg1">
+                    <a:lumMod val="95000"/>
+                  </a:schemeClr>
+                </a:solidFill>
+                <a:latin typeface="Exo 2"/>
+              </a:rPr>
+              <a:t>Professores;</a:t>
+            </a:r>
+          </a:p>
+          <a:p>
+            <a:pPr marL="457200" indent="-457200">
+              <a:buFont typeface="Arial" panose="020B0604020202020204" pitchFamily="34" charset="0"/>
+              <a:buChar char="•"/>
+            </a:pPr>
+            <a:r>
+              <a:rPr lang="pt-BR" sz="2400" b="1" dirty="0">
+                <a:solidFill>
+                  <a:schemeClr val="bg1">
+                    <a:lumMod val="95000"/>
+                  </a:schemeClr>
+                </a:solidFill>
+                <a:latin typeface="Exo 2"/>
+              </a:rPr>
+              <a:t>Colegas de classe;</a:t>
+            </a:r>
+          </a:p>
+          <a:p>
+            <a:pPr marL="457200" indent="-457200">
+              <a:buFont typeface="Arial" panose="020B0604020202020204" pitchFamily="34" charset="0"/>
+              <a:buChar char="•"/>
+            </a:pPr>
+            <a:r>
+              <a:rPr lang="pt-BR" sz="2400" b="1" dirty="0">
+                <a:solidFill>
+                  <a:schemeClr val="bg1">
+                    <a:lumMod val="95000"/>
+                  </a:schemeClr>
+                </a:solidFill>
+                <a:latin typeface="Exo 2"/>
+              </a:rPr>
+              <a:t>Grupo de PI;</a:t>
+            </a:r>
+          </a:p>
+          <a:p>
+            <a:pPr marL="457200" indent="-457200">
+              <a:buFont typeface="Arial" panose="020B0604020202020204" pitchFamily="34" charset="0"/>
+              <a:buChar char="•"/>
+            </a:pPr>
+            <a:r>
+              <a:rPr lang="pt-BR" sz="2400" b="1" dirty="0">
+                <a:solidFill>
+                  <a:schemeClr val="bg1">
+                    <a:lumMod val="95000"/>
+                  </a:schemeClr>
+                </a:solidFill>
+                <a:latin typeface="Exo 2"/>
+              </a:rPr>
+              <a:t>Mãe;</a:t>
+            </a:r>
+          </a:p>
+        </p:txBody>
+      </p:sp>
+      <p:sp>
+        <p:nvSpPr>
+          <p:cNvPr id="6" name="Retângulo 5">
+            <a:extLst>
+              <a:ext uri="{FF2B5EF4-FFF2-40B4-BE49-F238E27FC236}">
+                <a16:creationId xmlns:a16="http://schemas.microsoft.com/office/drawing/2014/main" id="{5A13F625-8AB4-4CF8-B2EF-FAC18D8AF490}"/>
+              </a:ext>
+            </a:extLst>
+          </p:cNvPr>
+          <p:cNvSpPr/>
+          <p:nvPr/>
+        </p:nvSpPr>
+        <p:spPr>
+          <a:xfrm>
+            <a:off x="4846320" y="3914384"/>
+            <a:ext cx="2270760" cy="2249715"/>
+          </a:xfrm>
+          <a:prstGeom prst="rect">
+            <a:avLst/>
+          </a:prstGeom>
+          <a:solidFill>
+            <a:schemeClr val="tx1">
+              <a:lumMod val="95000"/>
+              <a:lumOff val="5000"/>
+            </a:schemeClr>
+          </a:solidFill>
+          <a:ln w="28575">
+            <a:solidFill>
+              <a:schemeClr val="accent6">
+                <a:lumMod val="75000"/>
+              </a:schemeClr>
+            </a:solidFill>
+          </a:ln>
+        </p:spPr>
+        <p:style>
+          <a:lnRef idx="2">
+            <a:schemeClr val="accent1">
+              <a:shade val="50000"/>
+            </a:schemeClr>
+          </a:lnRef>
+          <a:fillRef idx="1">
+            <a:schemeClr val="accent1"/>
+          </a:fillRef>
+          <a:effectRef idx="0">
+            <a:schemeClr val="accent1"/>
+          </a:effectRef>
+          <a:fontRef idx="minor">
+            <a:schemeClr val="lt1"/>
+          </a:fontRef>
+        </p:style>
+        <p:txBody>
+          <a:bodyPr rtlCol="0" anchor="ctr"/>
+          <a:lstStyle/>
+          <a:p>
+            <a:pPr algn="ctr"/>
+            <a:endParaRPr lang="pt-BR"/>
+          </a:p>
+        </p:txBody>
+      </p:sp>
+      <p:pic>
+        <p:nvPicPr>
+          <p:cNvPr id="3074" name="Picture 2" descr="Agradecimentos | Casa dos Filtros">
+            <a:extLst>
+              <a:ext uri="{FF2B5EF4-FFF2-40B4-BE49-F238E27FC236}">
+                <a16:creationId xmlns:a16="http://schemas.microsoft.com/office/drawing/2014/main" id="{02FBA491-36DD-416E-9F6D-FA32523D88A5}"/>
+              </a:ext>
+            </a:extLst>
+          </p:cNvPr>
+          <p:cNvPicPr>
+            <a:picLocks noChangeAspect="1" noChangeArrowheads="1"/>
+          </p:cNvPicPr>
+          <p:nvPr/>
+        </p:nvPicPr>
+        <p:blipFill>
+          <a:blip r:embed="rId3">
+            <a:extLst>
+              <a:ext uri="{28A0092B-C50C-407E-A947-70E740481C1C}">
+                <a14:useLocalDpi xmlns:a14="http://schemas.microsoft.com/office/drawing/2010/main" val="0"/>
+              </a:ext>
+            </a:extLst>
+          </a:blip>
+          <a:srcRect/>
+          <a:stretch>
+            <a:fillRect/>
+          </a:stretch>
+        </p:blipFill>
+        <p:spPr bwMode="auto">
+          <a:xfrm>
+            <a:off x="5057128" y="4105792"/>
+            <a:ext cx="1866900" cy="1866900"/>
+          </a:xfrm>
+          <a:prstGeom prst="rect">
+            <a:avLst/>
+          </a:prstGeom>
+          <a:noFill/>
+          <a:extLst>
+            <a:ext uri="{909E8E84-426E-40DD-AFC4-6F175D3DCCD1}">
+              <a14:hiddenFill xmlns:a14="http://schemas.microsoft.com/office/drawing/2010/main">
+                <a:solidFill>
+                  <a:srgbClr val="FFFFFF"/>
+                </a:solidFill>
+              </a14:hiddenFill>
+            </a:ext>
+          </a:extLst>
+        </p:spPr>
+      </p:pic>
+    </p:spTree>
+    <p:extLst>
+      <p:ext uri="{BB962C8B-B14F-4D97-AF65-F5344CB8AC3E}">
+        <p14:creationId xmlns:p14="http://schemas.microsoft.com/office/powerpoint/2010/main" val="1550397929"/>
+      </p:ext>
+    </p:extLst>
+  </p:cSld>
+  <p:clrMapOvr>
+    <a:masterClrMapping/>
+  </p:clrMapOvr>
+</p:sld>
+</file>
+
+<file path=ppt/slides/slide11.xml><?xml version="1.0" encoding="utf-8"?>
+<p:sld xmlns:a="http://schemas.openxmlformats.org/drawingml/2006/main" xmlns:r="http://schemas.openxmlformats.org/officeDocument/2006/relationships" xmlns:p="http://schemas.openxmlformats.org/presentationml/2006/main">
+  <p:cSld>
+    <p:bg>
+      <p:bgPr>
+        <a:blipFill dpi="0" rotWithShape="1">
+          <a:blip r:embed="rId2">
+            <a:alphaModFix amt="95000"/>
+            <a:lum/>
+          </a:blip>
+          <a:srcRect/>
+          <a:stretch>
+            <a:fillRect/>
+          </a:stretch>
+        </a:blipFill>
+        <a:effectLst/>
+      </p:bgPr>
+    </p:bg>
+    <p:spTree>
+      <p:nvGrpSpPr>
+        <p:cNvPr id="1" name=""/>
+        <p:cNvGrpSpPr/>
+        <p:nvPr/>
+      </p:nvGrpSpPr>
+      <p:grpSpPr>
+        <a:xfrm>
+          <a:off x="0" y="0"/>
+          <a:ext cx="0" cy="0"/>
+          <a:chOff x="0" y="0"/>
+          <a:chExt cx="0" cy="0"/>
+        </a:xfrm>
+      </p:grpSpPr>
+      <p:sp>
+        <p:nvSpPr>
+          <p:cNvPr id="4" name="CaixaDeTexto 3">
+            <a:extLst>
+              <a:ext uri="{FF2B5EF4-FFF2-40B4-BE49-F238E27FC236}">
+                <a16:creationId xmlns:a16="http://schemas.microsoft.com/office/drawing/2014/main" id="{0ECDCC61-A651-4049-A986-DC84428183BF}"/>
+              </a:ext>
+            </a:extLst>
+          </p:cNvPr>
+          <p:cNvSpPr txBox="1"/>
+          <p:nvPr/>
+        </p:nvSpPr>
+        <p:spPr>
+          <a:xfrm>
+            <a:off x="3247111" y="2998113"/>
+            <a:ext cx="5697778" cy="861774"/>
+          </a:xfrm>
+          <a:prstGeom prst="rect">
+            <a:avLst/>
+          </a:prstGeom>
+          <a:noFill/>
+        </p:spPr>
+        <p:txBody>
+          <a:bodyPr wrap="none" rtlCol="0">
+            <a:spAutoFit/>
+          </a:bodyPr>
+          <a:lstStyle/>
+          <a:p>
+            <a:r>
+              <a:rPr lang="pt-BR" sz="5000" b="1" dirty="0">
+                <a:solidFill>
+                  <a:schemeClr val="bg1">
+                    <a:lumMod val="95000"/>
+                  </a:schemeClr>
+                </a:solidFill>
+                <a:effectLst>
+                  <a:glow rad="228600">
+                    <a:schemeClr val="accent6">
+                      <a:satMod val="175000"/>
+                      <a:alpha val="40000"/>
+                    </a:schemeClr>
+                  </a:glow>
+                </a:effectLst>
+                <a:latin typeface="Exo 2"/>
+              </a:rPr>
+              <a:t>OBRIGADO</a:t>
+            </a:r>
+            <a:r>
+              <a:rPr lang="pt-BR" sz="5000" b="1" dirty="0">
+                <a:solidFill>
+                  <a:schemeClr val="bg1">
+                    <a:lumMod val="95000"/>
+                  </a:schemeClr>
+                </a:solidFill>
+                <a:latin typeface="Exo 2"/>
+              </a:rPr>
+              <a:t> </a:t>
+            </a:r>
+            <a:r>
+              <a:rPr lang="pt-BR" sz="5000" b="1" dirty="0">
+                <a:solidFill>
+                  <a:schemeClr val="bg1">
+                    <a:lumMod val="95000"/>
+                  </a:schemeClr>
+                </a:solidFill>
+                <a:effectLst>
+                  <a:glow rad="228600">
+                    <a:schemeClr val="accent6">
+                      <a:satMod val="175000"/>
+                      <a:alpha val="40000"/>
+                    </a:schemeClr>
+                  </a:glow>
+                </a:effectLst>
+                <a:latin typeface="Exo 2"/>
+              </a:rPr>
+              <a:t>A</a:t>
+            </a:r>
+            <a:r>
+              <a:rPr lang="pt-BR" sz="5000" b="1" dirty="0">
+                <a:solidFill>
+                  <a:schemeClr val="bg1">
+                    <a:lumMod val="95000"/>
+                  </a:schemeClr>
+                </a:solidFill>
+                <a:latin typeface="Exo 2"/>
+              </a:rPr>
+              <a:t> </a:t>
+            </a:r>
+            <a:r>
+              <a:rPr lang="pt-BR" sz="5000" b="1" dirty="0">
+                <a:solidFill>
+                  <a:schemeClr val="bg1">
+                    <a:lumMod val="95000"/>
+                  </a:schemeClr>
+                </a:solidFill>
+                <a:effectLst>
+                  <a:glow rad="228600">
+                    <a:schemeClr val="accent6">
+                      <a:satMod val="175000"/>
+                      <a:alpha val="40000"/>
+                    </a:schemeClr>
+                  </a:glow>
+                </a:effectLst>
+                <a:latin typeface="Exo 2"/>
+              </a:rPr>
+              <a:t>TODOS</a:t>
+            </a:r>
+          </a:p>
+        </p:txBody>
+      </p:sp>
+    </p:spTree>
+    <p:extLst>
+      <p:ext uri="{BB962C8B-B14F-4D97-AF65-F5344CB8AC3E}">
+        <p14:creationId xmlns:p14="http://schemas.microsoft.com/office/powerpoint/2010/main" val="3439944453"/>
+      </p:ext>
+    </p:extLst>
+  </p:cSld>
+  <p:clrMapOvr>
+    <a:masterClrMapping/>
+  </p:clrMapOvr>
+</p:sld>
+</file>
+
 <file path=ppt/slides/slide2.xml><?xml version="1.0" encoding="utf-8"?>
 <p:sld xmlns:a="http://schemas.openxmlformats.org/drawingml/2006/main" xmlns:r="http://schemas.openxmlformats.org/officeDocument/2006/relationships" xmlns:p="http://schemas.openxmlformats.org/presentationml/2006/main">
   <p:cSld>
@@ -4200,8 +4773,8 @@
         </p:nvSpPr>
         <p:spPr>
           <a:xfrm flipV="1">
-            <a:off x="-144783" y="116113"/>
-            <a:ext cx="12481560" cy="7269091"/>
+            <a:off x="-144783" y="-137786"/>
+            <a:ext cx="12481560" cy="7522990"/>
           </a:xfrm>
           <a:prstGeom prst="snip2SameRect">
             <a:avLst>
@@ -4678,7 +5251,7 @@
         </p:nvSpPr>
         <p:spPr>
           <a:xfrm>
-            <a:off x="2431931" y="827315"/>
+            <a:off x="2380644" y="1246087"/>
             <a:ext cx="7318607" cy="3159846"/>
           </a:xfrm>
           <a:prstGeom prst="rect">
@@ -4737,7 +5310,7 @@
         </p:nvGrpSpPr>
         <p:grpSpPr>
           <a:xfrm>
-            <a:off x="2441462" y="717837"/>
+            <a:off x="2374598" y="1136609"/>
             <a:ext cx="7318607" cy="3119248"/>
             <a:chOff x="2441463" y="621342"/>
             <a:chExt cx="7318607" cy="3119248"/>
@@ -5176,7 +5749,7 @@
         </p:nvSpPr>
         <p:spPr>
           <a:xfrm>
-            <a:off x="5127927" y="4448825"/>
+            <a:off x="5071874" y="4646580"/>
             <a:ext cx="1914525" cy="1875775"/>
           </a:xfrm>
           <a:prstGeom prst="rect">
@@ -5250,7 +5823,7 @@
         </p:blipFill>
         <p:spPr bwMode="auto">
           <a:xfrm>
-            <a:off x="5243512" y="4541947"/>
+            <a:off x="5187459" y="4739702"/>
             <a:ext cx="1704975" cy="1704975"/>
           </a:xfrm>
           <a:prstGeom prst="rect">
@@ -6128,7 +6701,7 @@
         </p:nvSpPr>
         <p:spPr>
           <a:xfrm flipH="1">
-            <a:off x="8185699" y="2846297"/>
+            <a:off x="7792348" y="3351153"/>
             <a:ext cx="5103580" cy="1085850"/>
           </a:xfrm>
           <a:prstGeom prst="snip1Rect">
@@ -6189,7 +6762,7 @@
         </p:nvSpPr>
         <p:spPr>
           <a:xfrm>
-            <a:off x="8185699" y="2838646"/>
+            <a:off x="7792348" y="3343502"/>
             <a:ext cx="4209501" cy="1169551"/>
           </a:xfrm>
           <a:prstGeom prst="rect">
@@ -6244,7 +6817,7 @@
         </p:nvSpPr>
         <p:spPr>
           <a:xfrm flipH="1">
-            <a:off x="6234241" y="4453775"/>
+            <a:off x="6350552" y="4997648"/>
             <a:ext cx="6589656" cy="1129211"/>
           </a:xfrm>
           <a:prstGeom prst="snip1Rect">
@@ -6305,7 +6878,7 @@
         </p:nvSpPr>
         <p:spPr>
           <a:xfrm>
-            <a:off x="6599862" y="4419690"/>
+            <a:off x="6716173" y="4963563"/>
             <a:ext cx="5693738" cy="1200329"/>
           </a:xfrm>
           <a:prstGeom prst="rect">
@@ -6424,8 +6997,8 @@
         </p:nvSpPr>
         <p:spPr>
           <a:xfrm>
-            <a:off x="0" y="-166054"/>
-            <a:ext cx="12192000" cy="7188200"/>
+            <a:off x="-104384" y="-165100"/>
+            <a:ext cx="12400767" cy="7188200"/>
           </a:xfrm>
           <a:prstGeom prst="flowChartInputOutput">
             <a:avLst/>
@@ -6471,760 +7044,781 @@
           </a:p>
         </p:txBody>
       </p:sp>
-      <p:sp>
-        <p:nvSpPr>
-          <p:cNvPr id="11" name="Retângulo 10">
-            <a:extLst>
-              <a:ext uri="{FF2B5EF4-FFF2-40B4-BE49-F238E27FC236}">
-                <a16:creationId xmlns:a16="http://schemas.microsoft.com/office/drawing/2014/main" id="{6CEB6D5B-3020-4A02-8F4E-B3CEDD4F518B}"/>
-              </a:ext>
-            </a:extLst>
-          </p:cNvPr>
-          <p:cNvSpPr/>
+      <p:grpSp>
+        <p:nvGrpSpPr>
+          <p:cNvPr id="9" name="Agrupar 8">
+            <a:extLst>
+              <a:ext uri="{FF2B5EF4-FFF2-40B4-BE49-F238E27FC236}">
+                <a16:creationId xmlns:a16="http://schemas.microsoft.com/office/drawing/2014/main" id="{99219FDF-B1EF-4EFF-86AE-DA23FAEF834D}"/>
+              </a:ext>
+            </a:extLst>
+          </p:cNvPr>
+          <p:cNvGrpSpPr/>
           <p:nvPr/>
-        </p:nvSpPr>
-        <p:spPr>
+        </p:nvGrpSpPr>
+        <p:grpSpPr>
           <a:xfrm>
-            <a:off x="2303482" y="711200"/>
+            <a:off x="2243941" y="1173796"/>
             <a:ext cx="7704118" cy="4508500"/>
+            <a:chOff x="2243941" y="1173796"/>
+            <a:chExt cx="7704118" cy="4508500"/>
           </a:xfrm>
-          <a:prstGeom prst="rect">
-            <a:avLst/>
-          </a:prstGeom>
-          <a:solidFill>
-            <a:schemeClr val="tx1">
-              <a:lumMod val="95000"/>
-              <a:lumOff val="5000"/>
-            </a:schemeClr>
-          </a:solidFill>
-          <a:ln w="28575">
+        </p:grpSpPr>
+        <p:sp>
+          <p:nvSpPr>
+            <p:cNvPr id="11" name="Retângulo 10">
+              <a:extLst>
+                <a:ext uri="{FF2B5EF4-FFF2-40B4-BE49-F238E27FC236}">
+                  <a16:creationId xmlns:a16="http://schemas.microsoft.com/office/drawing/2014/main" id="{6CEB6D5B-3020-4A02-8F4E-B3CEDD4F518B}"/>
+                </a:ext>
+              </a:extLst>
+            </p:cNvPr>
+            <p:cNvSpPr/>
+            <p:nvPr/>
+          </p:nvSpPr>
+          <p:spPr>
+            <a:xfrm>
+              <a:off x="2243941" y="1173796"/>
+              <a:ext cx="7704118" cy="4508500"/>
+            </a:xfrm>
+            <a:prstGeom prst="rect">
+              <a:avLst/>
+            </a:prstGeom>
             <a:solidFill>
-              <a:schemeClr val="accent6">
-                <a:lumMod val="75000"/>
+              <a:schemeClr val="tx1">
+                <a:lumMod val="95000"/>
+                <a:lumOff val="5000"/>
               </a:schemeClr>
             </a:solidFill>
-          </a:ln>
-        </p:spPr>
-        <p:style>
-          <a:lnRef idx="2">
-            <a:schemeClr val="accent1">
-              <a:shade val="50000"/>
-            </a:schemeClr>
-          </a:lnRef>
-          <a:fillRef idx="1">
-            <a:schemeClr val="accent1"/>
-          </a:fillRef>
-          <a:effectRef idx="0">
-            <a:schemeClr val="accent1"/>
-          </a:effectRef>
-          <a:fontRef idx="minor">
-            <a:schemeClr val="lt1"/>
-          </a:fontRef>
-        </p:style>
-        <p:txBody>
-          <a:bodyPr rtlCol="0" anchor="ctr"/>
-          <a:lstStyle/>
-          <a:p>
-            <a:pPr algn="ctr"/>
-            <a:endParaRPr lang="pt-BR"/>
-          </a:p>
-        </p:txBody>
-      </p:sp>
-      <p:sp>
-        <p:nvSpPr>
-          <p:cNvPr id="2" name="CaixaDeTexto 1">
-            <a:extLst>
-              <a:ext uri="{FF2B5EF4-FFF2-40B4-BE49-F238E27FC236}">
-                <a16:creationId xmlns:a16="http://schemas.microsoft.com/office/drawing/2014/main" id="{5F56D761-FF38-4F41-9550-93E3E120A83E}"/>
-              </a:ext>
-            </a:extLst>
-          </p:cNvPr>
-          <p:cNvSpPr txBox="1"/>
-          <p:nvPr/>
-        </p:nvSpPr>
-        <p:spPr>
-          <a:xfrm>
-            <a:off x="5164142" y="711200"/>
-            <a:ext cx="1863715" cy="630942"/>
-          </a:xfrm>
-          <a:prstGeom prst="rect">
-            <a:avLst/>
-          </a:prstGeom>
-          <a:noFill/>
-        </p:spPr>
-        <p:txBody>
-          <a:bodyPr wrap="none" rtlCol="0">
-            <a:spAutoFit/>
-          </a:bodyPr>
-          <a:lstStyle/>
-          <a:p>
-            <a:r>
-              <a:rPr lang="pt-BR" sz="3500" b="1" dirty="0">
-                <a:solidFill>
-                  <a:schemeClr val="accent6">
-                    <a:lumMod val="75000"/>
-                  </a:schemeClr>
-                </a:solidFill>
-                <a:latin typeface="Exo 2"/>
-              </a:rPr>
-              <a:t>VALORES</a:t>
-            </a:r>
-          </a:p>
-        </p:txBody>
-      </p:sp>
-      <p:sp>
-        <p:nvSpPr>
-          <p:cNvPr id="4" name="CaixaDeTexto 3">
-            <a:extLst>
-              <a:ext uri="{FF2B5EF4-FFF2-40B4-BE49-F238E27FC236}">
-                <a16:creationId xmlns:a16="http://schemas.microsoft.com/office/drawing/2014/main" id="{E658CF57-50AD-4E8A-B097-F8FAE0EC554A}"/>
-              </a:ext>
-            </a:extLst>
-          </p:cNvPr>
-          <p:cNvSpPr txBox="1"/>
-          <p:nvPr/>
-        </p:nvSpPr>
-        <p:spPr>
-          <a:xfrm>
-            <a:off x="2550555" y="1375774"/>
-            <a:ext cx="1936171" cy="461665"/>
-          </a:xfrm>
-          <a:prstGeom prst="rect">
-            <a:avLst/>
-          </a:prstGeom>
-          <a:noFill/>
-        </p:spPr>
-        <p:txBody>
-          <a:bodyPr wrap="none" rtlCol="0">
-            <a:spAutoFit/>
-          </a:bodyPr>
-          <a:lstStyle/>
-          <a:p>
-            <a:r>
-              <a:rPr lang="pt-BR" sz="2400" b="1" dirty="0">
+            <a:ln w="28575">
+              <a:solidFill>
+                <a:schemeClr val="accent6">
+                  <a:lumMod val="75000"/>
+                </a:schemeClr>
+              </a:solidFill>
+            </a:ln>
+          </p:spPr>
+          <p:style>
+            <a:lnRef idx="2">
+              <a:schemeClr val="accent1">
+                <a:shade val="50000"/>
+              </a:schemeClr>
+            </a:lnRef>
+            <a:fillRef idx="1">
+              <a:schemeClr val="accent1"/>
+            </a:fillRef>
+            <a:effectRef idx="0">
+              <a:schemeClr val="accent1"/>
+            </a:effectRef>
+            <a:fontRef idx="minor">
+              <a:schemeClr val="lt1"/>
+            </a:fontRef>
+          </p:style>
+          <p:txBody>
+            <a:bodyPr rtlCol="0" anchor="ctr"/>
+            <a:lstStyle/>
+            <a:p>
+              <a:pPr algn="ctr"/>
+              <a:endParaRPr lang="pt-BR"/>
+            </a:p>
+          </p:txBody>
+        </p:sp>
+        <p:sp>
+          <p:nvSpPr>
+            <p:cNvPr id="2" name="CaixaDeTexto 1">
+              <a:extLst>
+                <a:ext uri="{FF2B5EF4-FFF2-40B4-BE49-F238E27FC236}">
+                  <a16:creationId xmlns:a16="http://schemas.microsoft.com/office/drawing/2014/main" id="{5F56D761-FF38-4F41-9550-93E3E120A83E}"/>
+                </a:ext>
+              </a:extLst>
+            </p:cNvPr>
+            <p:cNvSpPr txBox="1"/>
+            <p:nvPr/>
+          </p:nvSpPr>
+          <p:spPr>
+            <a:xfrm>
+              <a:off x="5104601" y="1173796"/>
+              <a:ext cx="1863715" cy="630942"/>
+            </a:xfrm>
+            <a:prstGeom prst="rect">
+              <a:avLst/>
+            </a:prstGeom>
+            <a:noFill/>
+          </p:spPr>
+          <p:txBody>
+            <a:bodyPr wrap="none" rtlCol="0">
+              <a:spAutoFit/>
+            </a:bodyPr>
+            <a:lstStyle/>
+            <a:p>
+              <a:r>
+                <a:rPr lang="pt-BR" sz="3500" b="1" dirty="0">
+                  <a:solidFill>
+                    <a:schemeClr val="accent6">
+                      <a:lumMod val="75000"/>
+                    </a:schemeClr>
+                  </a:solidFill>
+                  <a:latin typeface="Exo 2"/>
+                </a:rPr>
+                <a:t>VALORES</a:t>
+              </a:r>
+            </a:p>
+          </p:txBody>
+        </p:sp>
+        <p:sp>
+          <p:nvSpPr>
+            <p:cNvPr id="4" name="CaixaDeTexto 3">
+              <a:extLst>
+                <a:ext uri="{FF2B5EF4-FFF2-40B4-BE49-F238E27FC236}">
+                  <a16:creationId xmlns:a16="http://schemas.microsoft.com/office/drawing/2014/main" id="{E658CF57-50AD-4E8A-B097-F8FAE0EC554A}"/>
+                </a:ext>
+              </a:extLst>
+            </p:cNvPr>
+            <p:cNvSpPr txBox="1"/>
+            <p:nvPr/>
+          </p:nvSpPr>
+          <p:spPr>
+            <a:xfrm>
+              <a:off x="2491014" y="1838370"/>
+              <a:ext cx="1936171" cy="461665"/>
+            </a:xfrm>
+            <a:prstGeom prst="rect">
+              <a:avLst/>
+            </a:prstGeom>
+            <a:noFill/>
+          </p:spPr>
+          <p:txBody>
+            <a:bodyPr wrap="none" rtlCol="0">
+              <a:spAutoFit/>
+            </a:bodyPr>
+            <a:lstStyle/>
+            <a:p>
+              <a:r>
+                <a:rPr lang="pt-BR" sz="2400" b="1" dirty="0">
+                  <a:solidFill>
+                    <a:schemeClr val="bg1"/>
+                  </a:solidFill>
+                  <a:latin typeface="Exo 2"/>
+                </a:rPr>
+                <a:t>Compromisso</a:t>
+              </a:r>
+            </a:p>
+          </p:txBody>
+        </p:sp>
+        <p:sp>
+          <p:nvSpPr>
+            <p:cNvPr id="5" name="CaixaDeTexto 4">
+              <a:extLst>
+                <a:ext uri="{FF2B5EF4-FFF2-40B4-BE49-F238E27FC236}">
+                  <a16:creationId xmlns:a16="http://schemas.microsoft.com/office/drawing/2014/main" id="{5FBC3C47-6FC7-495B-A4C3-BDC37D8DC1B3}"/>
+                </a:ext>
+              </a:extLst>
+            </p:cNvPr>
+            <p:cNvSpPr txBox="1"/>
+            <p:nvPr/>
+          </p:nvSpPr>
+          <p:spPr>
+            <a:xfrm>
+              <a:off x="5042512" y="1838370"/>
+              <a:ext cx="1986762" cy="461665"/>
+            </a:xfrm>
+            <a:prstGeom prst="rect">
+              <a:avLst/>
+            </a:prstGeom>
+            <a:noFill/>
+          </p:spPr>
+          <p:txBody>
+            <a:bodyPr wrap="none" rtlCol="0">
+              <a:spAutoFit/>
+            </a:bodyPr>
+            <a:lstStyle/>
+            <a:p>
+              <a:r>
+                <a:rPr lang="pt-BR" sz="2400" b="1" dirty="0">
+                  <a:solidFill>
+                    <a:schemeClr val="bg1"/>
+                  </a:solidFill>
+                  <a:latin typeface="Exo 2"/>
+                </a:rPr>
+                <a:t>Determinação</a:t>
+              </a:r>
+            </a:p>
+          </p:txBody>
+        </p:sp>
+        <p:sp>
+          <p:nvSpPr>
+            <p:cNvPr id="6" name="CaixaDeTexto 5">
+              <a:extLst>
+                <a:ext uri="{FF2B5EF4-FFF2-40B4-BE49-F238E27FC236}">
+                  <a16:creationId xmlns:a16="http://schemas.microsoft.com/office/drawing/2014/main" id="{3F4404F7-9C60-4573-BEAD-5DDBB88E1ABD}"/>
+                </a:ext>
+              </a:extLst>
+            </p:cNvPr>
+            <p:cNvSpPr txBox="1"/>
+            <p:nvPr/>
+          </p:nvSpPr>
+          <p:spPr>
+            <a:xfrm>
+              <a:off x="7679371" y="1808912"/>
+              <a:ext cx="1878271" cy="461665"/>
+            </a:xfrm>
+            <a:prstGeom prst="rect">
+              <a:avLst/>
+            </a:prstGeom>
+            <a:noFill/>
+          </p:spPr>
+          <p:txBody>
+            <a:bodyPr wrap="none" rtlCol="0">
+              <a:spAutoFit/>
+            </a:bodyPr>
+            <a:lstStyle/>
+            <a:p>
+              <a:r>
+                <a:rPr lang="pt-BR" sz="2400" b="1" dirty="0">
+                  <a:solidFill>
+                    <a:schemeClr val="bg1"/>
+                  </a:solidFill>
+                  <a:latin typeface="Exo 2"/>
+                </a:rPr>
+                <a:t>Perseverança</a:t>
+              </a:r>
+            </a:p>
+          </p:txBody>
+        </p:sp>
+        <p:sp>
+          <p:nvSpPr>
+            <p:cNvPr id="7" name="Retângulo 6">
+              <a:extLst>
+                <a:ext uri="{FF2B5EF4-FFF2-40B4-BE49-F238E27FC236}">
+                  <a16:creationId xmlns:a16="http://schemas.microsoft.com/office/drawing/2014/main" id="{ABD8A758-546D-44C4-A5D9-BD5D800BA415}"/>
+                </a:ext>
+              </a:extLst>
+            </p:cNvPr>
+            <p:cNvSpPr/>
+            <p:nvPr/>
+          </p:nvSpPr>
+          <p:spPr>
+            <a:xfrm>
+              <a:off x="2698899" y="2328478"/>
+              <a:ext cx="1508760" cy="1480740"/>
+            </a:xfrm>
+            <a:prstGeom prst="rect">
+              <a:avLst/>
+            </a:prstGeom>
+            <a:solidFill>
+              <a:schemeClr val="tx1">
+                <a:lumMod val="95000"/>
+                <a:lumOff val="5000"/>
+              </a:schemeClr>
+            </a:solidFill>
+            <a:ln w="28575">
+              <a:solidFill>
+                <a:schemeClr val="accent6">
+                  <a:lumMod val="75000"/>
+                </a:schemeClr>
+              </a:solidFill>
+            </a:ln>
+          </p:spPr>
+          <p:style>
+            <a:lnRef idx="2">
+              <a:schemeClr val="accent1">
+                <a:shade val="50000"/>
+              </a:schemeClr>
+            </a:lnRef>
+            <a:fillRef idx="1">
+              <a:schemeClr val="accent1"/>
+            </a:fillRef>
+            <a:effectRef idx="0">
+              <a:schemeClr val="accent1"/>
+            </a:effectRef>
+            <a:fontRef idx="minor">
+              <a:schemeClr val="lt1"/>
+            </a:fontRef>
+          </p:style>
+          <p:txBody>
+            <a:bodyPr rtlCol="0" anchor="ctr"/>
+            <a:lstStyle/>
+            <a:p>
+              <a:pPr algn="ctr"/>
+              <a:endParaRPr lang="pt-BR" dirty="0"/>
+            </a:p>
+          </p:txBody>
+        </p:sp>
+        <p:pic>
+          <p:nvPicPr>
+            <p:cNvPr id="4100" name="Picture 4" descr="ICONE COMPROMISSO 2 » GRUPO SYM">
+              <a:extLst>
+                <a:ext uri="{FF2B5EF4-FFF2-40B4-BE49-F238E27FC236}">
+                  <a16:creationId xmlns:a16="http://schemas.microsoft.com/office/drawing/2014/main" id="{347F0A51-9F95-4A52-BBF2-FC96A748ABC0}"/>
+                </a:ext>
+              </a:extLst>
+            </p:cNvPr>
+            <p:cNvPicPr>
+              <a:picLocks noChangeAspect="1" noChangeArrowheads="1"/>
+            </p:cNvPicPr>
+            <p:nvPr/>
+          </p:nvPicPr>
+          <p:blipFill>
+            <a:blip r:embed="rId3">
+              <a:extLst>
+                <a:ext uri="{28A0092B-C50C-407E-A947-70E740481C1C}">
+                  <a14:useLocalDpi xmlns:a14="http://schemas.microsoft.com/office/drawing/2010/main" val="0"/>
+                </a:ext>
+              </a:extLst>
+            </a:blip>
+            <a:srcRect/>
+            <a:stretch>
+              <a:fillRect/>
+            </a:stretch>
+          </p:blipFill>
+          <p:spPr bwMode="auto">
+            <a:xfrm>
+              <a:off x="2797538" y="2409902"/>
+              <a:ext cx="1317891" cy="1317891"/>
+            </a:xfrm>
+            <a:prstGeom prst="rect">
+              <a:avLst/>
+            </a:prstGeom>
+            <a:noFill/>
+            <a:ln w="28575">
+              <a:solidFill>
+                <a:schemeClr val="accent6">
+                  <a:lumMod val="75000"/>
+                </a:schemeClr>
+              </a:solidFill>
+            </a:ln>
+            <a:extLst>
+              <a:ext uri="{909E8E84-426E-40DD-AFC4-6F175D3DCCD1}">
+                <a14:hiddenFill xmlns:a14="http://schemas.microsoft.com/office/drawing/2010/main">
+                  <a:solidFill>
+                    <a:srgbClr val="FFFFFF"/>
+                  </a:solidFill>
+                </a14:hiddenFill>
+              </a:ext>
+            </a:extLst>
+          </p:spPr>
+        </p:pic>
+        <p:sp>
+          <p:nvSpPr>
+            <p:cNvPr id="10" name="Retângulo 9">
+              <a:extLst>
+                <a:ext uri="{FF2B5EF4-FFF2-40B4-BE49-F238E27FC236}">
+                  <a16:creationId xmlns:a16="http://schemas.microsoft.com/office/drawing/2014/main" id="{93737719-B231-4DFF-B02C-30A64F775099}"/>
+                </a:ext>
+              </a:extLst>
+            </p:cNvPr>
+            <p:cNvSpPr/>
+            <p:nvPr/>
+          </p:nvSpPr>
+          <p:spPr>
+            <a:xfrm>
+              <a:off x="5281513" y="2300035"/>
+              <a:ext cx="1508760" cy="1480740"/>
+            </a:xfrm>
+            <a:prstGeom prst="rect">
+              <a:avLst/>
+            </a:prstGeom>
+            <a:solidFill>
+              <a:schemeClr val="tx1">
+                <a:lumMod val="95000"/>
+                <a:lumOff val="5000"/>
+              </a:schemeClr>
+            </a:solidFill>
+            <a:ln w="28575">
+              <a:solidFill>
+                <a:schemeClr val="accent6">
+                  <a:lumMod val="75000"/>
+                </a:schemeClr>
+              </a:solidFill>
+            </a:ln>
+          </p:spPr>
+          <p:style>
+            <a:lnRef idx="2">
+              <a:schemeClr val="accent1">
+                <a:shade val="50000"/>
+              </a:schemeClr>
+            </a:lnRef>
+            <a:fillRef idx="1">
+              <a:schemeClr val="accent1"/>
+            </a:fillRef>
+            <a:effectRef idx="0">
+              <a:schemeClr val="accent1"/>
+            </a:effectRef>
+            <a:fontRef idx="minor">
+              <a:schemeClr val="lt1"/>
+            </a:fontRef>
+          </p:style>
+          <p:txBody>
+            <a:bodyPr rtlCol="0" anchor="ctr"/>
+            <a:lstStyle/>
+            <a:p>
+              <a:pPr algn="ctr"/>
+              <a:endParaRPr lang="pt-BR" dirty="0"/>
+            </a:p>
+          </p:txBody>
+        </p:sp>
+        <p:pic>
+          <p:nvPicPr>
+            <p:cNvPr id="4102" name="Picture 6" descr="Determinação - ícones de mãos e gestos grátis">
+              <a:extLst>
+                <a:ext uri="{FF2B5EF4-FFF2-40B4-BE49-F238E27FC236}">
+                  <a16:creationId xmlns:a16="http://schemas.microsoft.com/office/drawing/2014/main" id="{3570F3D6-93E9-4944-81FF-FAA38D7D2E16}"/>
+                </a:ext>
+              </a:extLst>
+            </p:cNvPr>
+            <p:cNvPicPr>
+              <a:picLocks noChangeAspect="1" noChangeArrowheads="1"/>
+            </p:cNvPicPr>
+            <p:nvPr/>
+          </p:nvPicPr>
+          <p:blipFill>
+            <a:blip r:embed="rId4">
+              <a:extLst>
+                <a:ext uri="{28A0092B-C50C-407E-A947-70E740481C1C}">
+                  <a14:useLocalDpi xmlns:a14="http://schemas.microsoft.com/office/drawing/2010/main" val="0"/>
+                </a:ext>
+              </a:extLst>
+            </a:blip>
+            <a:srcRect/>
+            <a:stretch>
+              <a:fillRect/>
+            </a:stretch>
+          </p:blipFill>
+          <p:spPr bwMode="auto">
+            <a:xfrm>
+              <a:off x="5375754" y="2380380"/>
+              <a:ext cx="1320277" cy="1320277"/>
+            </a:xfrm>
+            <a:prstGeom prst="rect">
+              <a:avLst/>
+            </a:prstGeom>
+            <a:noFill/>
+            <a:ln w="28575">
+              <a:solidFill>
+                <a:schemeClr val="accent6">
+                  <a:lumMod val="75000"/>
+                </a:schemeClr>
+              </a:solidFill>
+            </a:ln>
+            <a:extLst>
+              <a:ext uri="{909E8E84-426E-40DD-AFC4-6F175D3DCCD1}">
+                <a14:hiddenFill xmlns:a14="http://schemas.microsoft.com/office/drawing/2010/main">
+                  <a:solidFill>
+                    <a:srgbClr val="FFFFFF"/>
+                  </a:solidFill>
+                </a14:hiddenFill>
+              </a:ext>
+            </a:extLst>
+          </p:spPr>
+        </p:pic>
+        <p:sp>
+          <p:nvSpPr>
+            <p:cNvPr id="12" name="Retângulo 11">
+              <a:extLst>
+                <a:ext uri="{FF2B5EF4-FFF2-40B4-BE49-F238E27FC236}">
+                  <a16:creationId xmlns:a16="http://schemas.microsoft.com/office/drawing/2014/main" id="{114E2E88-ADCA-4078-BB9A-5F873F0E6822}"/>
+                </a:ext>
+              </a:extLst>
+            </p:cNvPr>
+            <p:cNvSpPr/>
+            <p:nvPr/>
+          </p:nvSpPr>
+          <p:spPr>
+            <a:xfrm>
+              <a:off x="7864127" y="2300034"/>
+              <a:ext cx="1508760" cy="1480740"/>
+            </a:xfrm>
+            <a:prstGeom prst="rect">
+              <a:avLst/>
+            </a:prstGeom>
+            <a:solidFill>
+              <a:schemeClr val="tx1">
+                <a:lumMod val="95000"/>
+                <a:lumOff val="5000"/>
+              </a:schemeClr>
+            </a:solidFill>
+            <a:ln w="28575">
+              <a:solidFill>
+                <a:schemeClr val="accent6">
+                  <a:lumMod val="75000"/>
+                </a:schemeClr>
+              </a:solidFill>
+            </a:ln>
+          </p:spPr>
+          <p:style>
+            <a:lnRef idx="2">
+              <a:schemeClr val="accent1">
+                <a:shade val="50000"/>
+              </a:schemeClr>
+            </a:lnRef>
+            <a:fillRef idx="1">
+              <a:schemeClr val="accent1"/>
+            </a:fillRef>
+            <a:effectRef idx="0">
+              <a:schemeClr val="accent1"/>
+            </a:effectRef>
+            <a:fontRef idx="minor">
+              <a:schemeClr val="lt1"/>
+            </a:fontRef>
+          </p:style>
+          <p:txBody>
+            <a:bodyPr rtlCol="0" anchor="ctr"/>
+            <a:lstStyle/>
+            <a:p>
+              <a:pPr algn="ctr"/>
+              <a:endParaRPr lang="pt-BR" dirty="0"/>
+            </a:p>
+          </p:txBody>
+        </p:sp>
+        <p:pic>
+          <p:nvPicPr>
+            <p:cNvPr id="4104" name="Picture 8" descr="Vetores de Ícone De Persistência Com Imagem De Extrema Motivação Unidade  Definida Na Perseverante e mais imagens de Adversidade - iStock">
+              <a:extLst>
+                <a:ext uri="{FF2B5EF4-FFF2-40B4-BE49-F238E27FC236}">
+                  <a16:creationId xmlns:a16="http://schemas.microsoft.com/office/drawing/2014/main" id="{442EEC32-55D6-46B3-BD37-117AD34D1312}"/>
+                </a:ext>
+              </a:extLst>
+            </p:cNvPr>
+            <p:cNvPicPr>
+              <a:picLocks noChangeAspect="1" noChangeArrowheads="1"/>
+            </p:cNvPicPr>
+            <p:nvPr/>
+          </p:nvPicPr>
+          <p:blipFill>
+            <a:blip r:embed="rId5">
+              <a:extLst>
+                <a:ext uri="{28A0092B-C50C-407E-A947-70E740481C1C}">
+                  <a14:useLocalDpi xmlns:a14="http://schemas.microsoft.com/office/drawing/2010/main" val="0"/>
+                </a:ext>
+              </a:extLst>
+            </a:blip>
+            <a:srcRect/>
+            <a:stretch>
+              <a:fillRect/>
+            </a:stretch>
+          </p:blipFill>
+          <p:spPr bwMode="auto">
+            <a:xfrm>
+              <a:off x="7955103" y="2380265"/>
+              <a:ext cx="1320277" cy="1320277"/>
+            </a:xfrm>
+            <a:prstGeom prst="rect">
+              <a:avLst/>
+            </a:prstGeom>
+            <a:noFill/>
+            <a:ln w="28575">
+              <a:solidFill>
+                <a:schemeClr val="accent6">
+                  <a:lumMod val="75000"/>
+                </a:schemeClr>
+              </a:solidFill>
+            </a:ln>
+            <a:extLst>
+              <a:ext uri="{909E8E84-426E-40DD-AFC4-6F175D3DCCD1}">
+                <a14:hiddenFill xmlns:a14="http://schemas.microsoft.com/office/drawing/2010/main">
+                  <a:solidFill>
+                    <a:srgbClr val="FFFFFF"/>
+                  </a:solidFill>
+                </a14:hiddenFill>
+              </a:ext>
+            </a:extLst>
+          </p:spPr>
+        </p:pic>
+        <p:sp>
+          <p:nvSpPr>
+            <p:cNvPr id="8" name="CaixaDeTexto 7">
+              <a:extLst>
+                <a:ext uri="{FF2B5EF4-FFF2-40B4-BE49-F238E27FC236}">
+                  <a16:creationId xmlns:a16="http://schemas.microsoft.com/office/drawing/2014/main" id="{27F2DF5A-9617-460E-9FFA-C88F24350D46}"/>
+                </a:ext>
+              </a:extLst>
+            </p:cNvPr>
+            <p:cNvSpPr txBox="1"/>
+            <p:nvPr/>
+          </p:nvSpPr>
+          <p:spPr>
+            <a:xfrm>
+              <a:off x="2243941" y="4005829"/>
+              <a:ext cx="2418675" cy="1477328"/>
+            </a:xfrm>
+            <a:prstGeom prst="rect">
+              <a:avLst/>
+            </a:prstGeom>
+            <a:noFill/>
+          </p:spPr>
+          <p:txBody>
+            <a:bodyPr wrap="square" rtlCol="0">
+              <a:spAutoFit/>
+            </a:bodyPr>
+            <a:lstStyle/>
+            <a:p>
+              <a:pPr marL="285750" indent="-285750" algn="ctr">
+                <a:buFont typeface="Arial" panose="020B0604020202020204" pitchFamily="34" charset="0"/>
+                <a:buChar char="•"/>
+              </a:pPr>
+              <a:r>
+                <a:rPr lang="pt-BR" dirty="0">
+                  <a:solidFill>
+                    <a:schemeClr val="bg1"/>
+                  </a:solidFill>
+                  <a:latin typeface="Exo 2"/>
+                </a:rPr>
+                <a:t>Não tenho facilidade</a:t>
+              </a:r>
+            </a:p>
+            <a:p>
+              <a:pPr algn="ctr"/>
+              <a:r>
+                <a:rPr lang="pt-BR" dirty="0">
+                  <a:solidFill>
+                    <a:schemeClr val="bg1"/>
+                  </a:solidFill>
+                  <a:latin typeface="Exo 2"/>
+                </a:rPr>
+                <a:t>com HTML e CSS;</a:t>
+              </a:r>
+            </a:p>
+            <a:p>
+              <a:pPr algn="ctr"/>
+              <a:endParaRPr lang="pt-BR" dirty="0">
                 <a:solidFill>
                   <a:schemeClr val="bg1"/>
                 </a:solidFill>
                 <a:latin typeface="Exo 2"/>
-              </a:rPr>
-              <a:t>Compromisso</a:t>
-            </a:r>
-          </a:p>
-        </p:txBody>
-      </p:sp>
-      <p:sp>
-        <p:nvSpPr>
-          <p:cNvPr id="5" name="CaixaDeTexto 4">
-            <a:extLst>
-              <a:ext uri="{FF2B5EF4-FFF2-40B4-BE49-F238E27FC236}">
-                <a16:creationId xmlns:a16="http://schemas.microsoft.com/office/drawing/2014/main" id="{5FBC3C47-6FC7-495B-A4C3-BDC37D8DC1B3}"/>
-              </a:ext>
-            </a:extLst>
-          </p:cNvPr>
-          <p:cNvSpPr txBox="1"/>
-          <p:nvPr/>
-        </p:nvSpPr>
-        <p:spPr>
-          <a:xfrm>
-            <a:off x="5102053" y="1375774"/>
-            <a:ext cx="1986762" cy="461665"/>
-          </a:xfrm>
-          <a:prstGeom prst="rect">
-            <a:avLst/>
-          </a:prstGeom>
-          <a:noFill/>
-        </p:spPr>
-        <p:txBody>
-          <a:bodyPr wrap="none" rtlCol="0">
-            <a:spAutoFit/>
-          </a:bodyPr>
-          <a:lstStyle/>
-          <a:p>
-            <a:r>
-              <a:rPr lang="pt-BR" sz="2400" b="1" dirty="0">
-                <a:solidFill>
-                  <a:schemeClr val="bg1"/>
-                </a:solidFill>
-                <a:latin typeface="Exo 2"/>
-              </a:rPr>
-              <a:t>Determinação</a:t>
-            </a:r>
-          </a:p>
-        </p:txBody>
-      </p:sp>
-      <p:sp>
-        <p:nvSpPr>
-          <p:cNvPr id="6" name="CaixaDeTexto 5">
-            <a:extLst>
-              <a:ext uri="{FF2B5EF4-FFF2-40B4-BE49-F238E27FC236}">
-                <a16:creationId xmlns:a16="http://schemas.microsoft.com/office/drawing/2014/main" id="{3F4404F7-9C60-4573-BEAD-5DDBB88E1ABD}"/>
-              </a:ext>
-            </a:extLst>
-          </p:cNvPr>
-          <p:cNvSpPr txBox="1"/>
-          <p:nvPr/>
-        </p:nvSpPr>
-        <p:spPr>
-          <a:xfrm>
-            <a:off x="7738912" y="1346316"/>
-            <a:ext cx="1878271" cy="461665"/>
-          </a:xfrm>
-          <a:prstGeom prst="rect">
-            <a:avLst/>
-          </a:prstGeom>
-          <a:noFill/>
-        </p:spPr>
-        <p:txBody>
-          <a:bodyPr wrap="none" rtlCol="0">
-            <a:spAutoFit/>
-          </a:bodyPr>
-          <a:lstStyle/>
-          <a:p>
-            <a:r>
-              <a:rPr lang="pt-BR" sz="2400" b="1" dirty="0">
-                <a:solidFill>
-                  <a:schemeClr val="bg1"/>
-                </a:solidFill>
-                <a:latin typeface="Exo 2"/>
-              </a:rPr>
-              <a:t>Perseverança</a:t>
-            </a:r>
-          </a:p>
-        </p:txBody>
-      </p:sp>
-      <p:sp>
-        <p:nvSpPr>
-          <p:cNvPr id="7" name="Retângulo 6">
-            <a:extLst>
-              <a:ext uri="{FF2B5EF4-FFF2-40B4-BE49-F238E27FC236}">
-                <a16:creationId xmlns:a16="http://schemas.microsoft.com/office/drawing/2014/main" id="{ABD8A758-546D-44C4-A5D9-BD5D800BA415}"/>
-              </a:ext>
-            </a:extLst>
-          </p:cNvPr>
-          <p:cNvSpPr/>
-          <p:nvPr/>
-        </p:nvSpPr>
-        <p:spPr>
-          <a:xfrm>
-            <a:off x="2758440" y="1865882"/>
-            <a:ext cx="1508760" cy="1480740"/>
-          </a:xfrm>
-          <a:prstGeom prst="rect">
-            <a:avLst/>
-          </a:prstGeom>
-          <a:solidFill>
-            <a:schemeClr val="tx1">
-              <a:lumMod val="95000"/>
-              <a:lumOff val="5000"/>
-            </a:schemeClr>
-          </a:solidFill>
-          <a:ln w="28575">
-            <a:solidFill>
-              <a:schemeClr val="accent6">
-                <a:lumMod val="75000"/>
-              </a:schemeClr>
-            </a:solidFill>
-          </a:ln>
-        </p:spPr>
-        <p:style>
-          <a:lnRef idx="2">
-            <a:schemeClr val="accent1">
-              <a:shade val="50000"/>
-            </a:schemeClr>
-          </a:lnRef>
-          <a:fillRef idx="1">
-            <a:schemeClr val="accent1"/>
-          </a:fillRef>
-          <a:effectRef idx="0">
-            <a:schemeClr val="accent1"/>
-          </a:effectRef>
-          <a:fontRef idx="minor">
-            <a:schemeClr val="lt1"/>
-          </a:fontRef>
-        </p:style>
-        <p:txBody>
-          <a:bodyPr rtlCol="0" anchor="ctr"/>
-          <a:lstStyle/>
-          <a:p>
-            <a:pPr algn="ctr"/>
-            <a:endParaRPr lang="pt-BR" dirty="0"/>
-          </a:p>
-        </p:txBody>
-      </p:sp>
-      <p:pic>
-        <p:nvPicPr>
-          <p:cNvPr id="4100" name="Picture 4" descr="ICONE COMPROMISSO 2 » GRUPO SYM">
-            <a:extLst>
-              <a:ext uri="{FF2B5EF4-FFF2-40B4-BE49-F238E27FC236}">
-                <a16:creationId xmlns:a16="http://schemas.microsoft.com/office/drawing/2014/main" id="{347F0A51-9F95-4A52-BBF2-FC96A748ABC0}"/>
-              </a:ext>
-            </a:extLst>
-          </p:cNvPr>
-          <p:cNvPicPr>
-            <a:picLocks noChangeAspect="1" noChangeArrowheads="1"/>
-          </p:cNvPicPr>
-          <p:nvPr/>
-        </p:nvPicPr>
-        <p:blipFill>
-          <a:blip r:embed="rId3">
-            <a:extLst>
-              <a:ext uri="{28A0092B-C50C-407E-A947-70E740481C1C}">
-                <a14:useLocalDpi xmlns:a14="http://schemas.microsoft.com/office/drawing/2010/main" val="0"/>
-              </a:ext>
-            </a:extLst>
-          </a:blip>
-          <a:srcRect/>
-          <a:stretch>
-            <a:fillRect/>
-          </a:stretch>
-        </p:blipFill>
-        <p:spPr bwMode="auto">
-          <a:xfrm>
-            <a:off x="2857079" y="1947306"/>
-            <a:ext cx="1317891" cy="1317891"/>
-          </a:xfrm>
-          <a:prstGeom prst="rect">
-            <a:avLst/>
-          </a:prstGeom>
-          <a:noFill/>
-          <a:ln w="28575">
-            <a:solidFill>
-              <a:schemeClr val="accent6">
-                <a:lumMod val="75000"/>
-              </a:schemeClr>
-            </a:solidFill>
-          </a:ln>
-          <a:extLst>
-            <a:ext uri="{909E8E84-426E-40DD-AFC4-6F175D3DCCD1}">
-              <a14:hiddenFill xmlns:a14="http://schemas.microsoft.com/office/drawing/2010/main">
-                <a:solidFill>
-                  <a:srgbClr val="FFFFFF"/>
-                </a:solidFill>
-              </a14:hiddenFill>
-            </a:ext>
-          </a:extLst>
-        </p:spPr>
-      </p:pic>
-      <p:sp>
-        <p:nvSpPr>
-          <p:cNvPr id="10" name="Retângulo 9">
-            <a:extLst>
-              <a:ext uri="{FF2B5EF4-FFF2-40B4-BE49-F238E27FC236}">
-                <a16:creationId xmlns:a16="http://schemas.microsoft.com/office/drawing/2014/main" id="{93737719-B231-4DFF-B02C-30A64F775099}"/>
-              </a:ext>
-            </a:extLst>
-          </p:cNvPr>
-          <p:cNvSpPr/>
-          <p:nvPr/>
-        </p:nvSpPr>
-        <p:spPr>
-          <a:xfrm>
-            <a:off x="5341054" y="1837439"/>
-            <a:ext cx="1508760" cy="1480740"/>
-          </a:xfrm>
-          <a:prstGeom prst="rect">
-            <a:avLst/>
-          </a:prstGeom>
-          <a:solidFill>
-            <a:schemeClr val="tx1">
-              <a:lumMod val="95000"/>
-              <a:lumOff val="5000"/>
-            </a:schemeClr>
-          </a:solidFill>
-          <a:ln w="28575">
-            <a:solidFill>
-              <a:schemeClr val="accent6">
-                <a:lumMod val="75000"/>
-              </a:schemeClr>
-            </a:solidFill>
-          </a:ln>
-        </p:spPr>
-        <p:style>
-          <a:lnRef idx="2">
-            <a:schemeClr val="accent1">
-              <a:shade val="50000"/>
-            </a:schemeClr>
-          </a:lnRef>
-          <a:fillRef idx="1">
-            <a:schemeClr val="accent1"/>
-          </a:fillRef>
-          <a:effectRef idx="0">
-            <a:schemeClr val="accent1"/>
-          </a:effectRef>
-          <a:fontRef idx="minor">
-            <a:schemeClr val="lt1"/>
-          </a:fontRef>
-        </p:style>
-        <p:txBody>
-          <a:bodyPr rtlCol="0" anchor="ctr"/>
-          <a:lstStyle/>
-          <a:p>
-            <a:pPr algn="ctr"/>
-            <a:endParaRPr lang="pt-BR" dirty="0"/>
-          </a:p>
-        </p:txBody>
-      </p:sp>
-      <p:pic>
-        <p:nvPicPr>
-          <p:cNvPr id="4102" name="Picture 6" descr="Determinação - ícones de mãos e gestos grátis">
-            <a:extLst>
-              <a:ext uri="{FF2B5EF4-FFF2-40B4-BE49-F238E27FC236}">
-                <a16:creationId xmlns:a16="http://schemas.microsoft.com/office/drawing/2014/main" id="{3570F3D6-93E9-4944-81FF-FAA38D7D2E16}"/>
-              </a:ext>
-            </a:extLst>
-          </p:cNvPr>
-          <p:cNvPicPr>
-            <a:picLocks noChangeAspect="1" noChangeArrowheads="1"/>
-          </p:cNvPicPr>
-          <p:nvPr/>
-        </p:nvPicPr>
-        <p:blipFill>
-          <a:blip r:embed="rId4">
-            <a:extLst>
-              <a:ext uri="{28A0092B-C50C-407E-A947-70E740481C1C}">
-                <a14:useLocalDpi xmlns:a14="http://schemas.microsoft.com/office/drawing/2010/main" val="0"/>
-              </a:ext>
-            </a:extLst>
-          </a:blip>
-          <a:srcRect/>
-          <a:stretch>
-            <a:fillRect/>
-          </a:stretch>
-        </p:blipFill>
-        <p:spPr bwMode="auto">
-          <a:xfrm>
-            <a:off x="5435295" y="1917784"/>
-            <a:ext cx="1320277" cy="1320277"/>
-          </a:xfrm>
-          <a:prstGeom prst="rect">
-            <a:avLst/>
-          </a:prstGeom>
-          <a:noFill/>
-          <a:ln w="28575">
-            <a:solidFill>
-              <a:schemeClr val="accent6">
-                <a:lumMod val="75000"/>
-              </a:schemeClr>
-            </a:solidFill>
-          </a:ln>
-          <a:extLst>
-            <a:ext uri="{909E8E84-426E-40DD-AFC4-6F175D3DCCD1}">
-              <a14:hiddenFill xmlns:a14="http://schemas.microsoft.com/office/drawing/2010/main">
-                <a:solidFill>
-                  <a:srgbClr val="FFFFFF"/>
-                </a:solidFill>
-              </a14:hiddenFill>
-            </a:ext>
-          </a:extLst>
-        </p:spPr>
-      </p:pic>
-      <p:sp>
-        <p:nvSpPr>
-          <p:cNvPr id="12" name="Retângulo 11">
-            <a:extLst>
-              <a:ext uri="{FF2B5EF4-FFF2-40B4-BE49-F238E27FC236}">
-                <a16:creationId xmlns:a16="http://schemas.microsoft.com/office/drawing/2014/main" id="{114E2E88-ADCA-4078-BB9A-5F873F0E6822}"/>
-              </a:ext>
-            </a:extLst>
-          </p:cNvPr>
-          <p:cNvSpPr/>
-          <p:nvPr/>
-        </p:nvSpPr>
-        <p:spPr>
-          <a:xfrm>
-            <a:off x="7923668" y="1837438"/>
-            <a:ext cx="1508760" cy="1480740"/>
-          </a:xfrm>
-          <a:prstGeom prst="rect">
-            <a:avLst/>
-          </a:prstGeom>
-          <a:solidFill>
-            <a:schemeClr val="tx1">
-              <a:lumMod val="95000"/>
-              <a:lumOff val="5000"/>
-            </a:schemeClr>
-          </a:solidFill>
-          <a:ln w="28575">
-            <a:solidFill>
-              <a:schemeClr val="accent6">
-                <a:lumMod val="75000"/>
-              </a:schemeClr>
-            </a:solidFill>
-          </a:ln>
-        </p:spPr>
-        <p:style>
-          <a:lnRef idx="2">
-            <a:schemeClr val="accent1">
-              <a:shade val="50000"/>
-            </a:schemeClr>
-          </a:lnRef>
-          <a:fillRef idx="1">
-            <a:schemeClr val="accent1"/>
-          </a:fillRef>
-          <a:effectRef idx="0">
-            <a:schemeClr val="accent1"/>
-          </a:effectRef>
-          <a:fontRef idx="minor">
-            <a:schemeClr val="lt1"/>
-          </a:fontRef>
-        </p:style>
-        <p:txBody>
-          <a:bodyPr rtlCol="0" anchor="ctr"/>
-          <a:lstStyle/>
-          <a:p>
-            <a:pPr algn="ctr"/>
-            <a:endParaRPr lang="pt-BR" dirty="0"/>
-          </a:p>
-        </p:txBody>
-      </p:sp>
-      <p:pic>
-        <p:nvPicPr>
-          <p:cNvPr id="4104" name="Picture 8" descr="Vetores de Ícone De Persistência Com Imagem De Extrema Motivação Unidade  Definida Na Perseverante e mais imagens de Adversidade - iStock">
-            <a:extLst>
-              <a:ext uri="{FF2B5EF4-FFF2-40B4-BE49-F238E27FC236}">
-                <a16:creationId xmlns:a16="http://schemas.microsoft.com/office/drawing/2014/main" id="{442EEC32-55D6-46B3-BD37-117AD34D1312}"/>
-              </a:ext>
-            </a:extLst>
-          </p:cNvPr>
-          <p:cNvPicPr>
-            <a:picLocks noChangeAspect="1" noChangeArrowheads="1"/>
-          </p:cNvPicPr>
-          <p:nvPr/>
-        </p:nvPicPr>
-        <p:blipFill>
-          <a:blip r:embed="rId5">
-            <a:extLst>
-              <a:ext uri="{28A0092B-C50C-407E-A947-70E740481C1C}">
-                <a14:useLocalDpi xmlns:a14="http://schemas.microsoft.com/office/drawing/2010/main" val="0"/>
-              </a:ext>
-            </a:extLst>
-          </a:blip>
-          <a:srcRect/>
-          <a:stretch>
-            <a:fillRect/>
-          </a:stretch>
-        </p:blipFill>
-        <p:spPr bwMode="auto">
-          <a:xfrm>
-            <a:off x="8014644" y="1917669"/>
-            <a:ext cx="1320277" cy="1320277"/>
-          </a:xfrm>
-          <a:prstGeom prst="rect">
-            <a:avLst/>
-          </a:prstGeom>
-          <a:noFill/>
-          <a:ln w="28575">
-            <a:solidFill>
-              <a:schemeClr val="accent6">
-                <a:lumMod val="75000"/>
-              </a:schemeClr>
-            </a:solidFill>
-          </a:ln>
-          <a:extLst>
-            <a:ext uri="{909E8E84-426E-40DD-AFC4-6F175D3DCCD1}">
-              <a14:hiddenFill xmlns:a14="http://schemas.microsoft.com/office/drawing/2010/main">
-                <a:solidFill>
-                  <a:srgbClr val="FFFFFF"/>
-                </a:solidFill>
-              </a14:hiddenFill>
-            </a:ext>
-          </a:extLst>
-        </p:spPr>
-      </p:pic>
-      <p:sp>
-        <p:nvSpPr>
-          <p:cNvPr id="8" name="CaixaDeTexto 7">
-            <a:extLst>
-              <a:ext uri="{FF2B5EF4-FFF2-40B4-BE49-F238E27FC236}">
-                <a16:creationId xmlns:a16="http://schemas.microsoft.com/office/drawing/2014/main" id="{27F2DF5A-9617-460E-9FFA-C88F24350D46}"/>
-              </a:ext>
-            </a:extLst>
-          </p:cNvPr>
-          <p:cNvSpPr txBox="1"/>
-          <p:nvPr/>
-        </p:nvSpPr>
-        <p:spPr>
-          <a:xfrm>
-            <a:off x="2303482" y="3543233"/>
-            <a:ext cx="2418675" cy="1477328"/>
-          </a:xfrm>
-          <a:prstGeom prst="rect">
-            <a:avLst/>
-          </a:prstGeom>
-          <a:noFill/>
-        </p:spPr>
-        <p:txBody>
-          <a:bodyPr wrap="square" rtlCol="0">
-            <a:spAutoFit/>
-          </a:bodyPr>
-          <a:lstStyle/>
-          <a:p>
-            <a:pPr marL="285750" indent="-285750" algn="ctr">
-              <a:buFont typeface="Arial" panose="020B0604020202020204" pitchFamily="34" charset="0"/>
-              <a:buChar char="•"/>
-            </a:pPr>
-            <a:r>
-              <a:rPr lang="pt-BR" dirty="0">
-                <a:solidFill>
-                  <a:schemeClr val="bg1"/>
-                </a:solidFill>
-                <a:latin typeface="Exo 2"/>
-              </a:rPr>
-              <a:t>Não tenho facilidade</a:t>
-            </a:r>
-          </a:p>
-          <a:p>
-            <a:pPr algn="ctr"/>
-            <a:r>
-              <a:rPr lang="pt-BR" dirty="0">
-                <a:solidFill>
-                  <a:schemeClr val="bg1"/>
-                </a:solidFill>
-                <a:latin typeface="Exo 2"/>
-              </a:rPr>
-              <a:t>com HTML e CSS;</a:t>
-            </a:r>
-          </a:p>
-          <a:p>
-            <a:pPr algn="ctr"/>
-            <a:endParaRPr lang="pt-BR" dirty="0">
-              <a:solidFill>
-                <a:schemeClr val="bg1"/>
-              </a:solidFill>
-              <a:latin typeface="Exo 2"/>
-            </a:endParaRPr>
-          </a:p>
-          <a:p>
-            <a:pPr marL="285750" indent="-285750">
-              <a:buFont typeface="Arial" panose="020B0604020202020204" pitchFamily="34" charset="0"/>
-              <a:buChar char="•"/>
-            </a:pPr>
-            <a:r>
-              <a:rPr lang="pt-BR" dirty="0">
-                <a:solidFill>
-                  <a:schemeClr val="bg1"/>
-                </a:solidFill>
-                <a:latin typeface="Exo 2"/>
-              </a:rPr>
-              <a:t>Não gosto de lidar </a:t>
-            </a:r>
-          </a:p>
-          <a:p>
-            <a:r>
-              <a:rPr lang="pt-BR" dirty="0">
-                <a:solidFill>
-                  <a:schemeClr val="bg1"/>
-                </a:solidFill>
-                <a:latin typeface="Exo 2"/>
-              </a:rPr>
-              <a:t>      com sites.</a:t>
-            </a:r>
-          </a:p>
-        </p:txBody>
-      </p:sp>
-      <p:sp>
-        <p:nvSpPr>
-          <p:cNvPr id="16" name="CaixaDeTexto 15">
-            <a:extLst>
-              <a:ext uri="{FF2B5EF4-FFF2-40B4-BE49-F238E27FC236}">
-                <a16:creationId xmlns:a16="http://schemas.microsoft.com/office/drawing/2014/main" id="{FD6D2A53-BE29-47EB-91DC-1C24219FFECD}"/>
-              </a:ext>
-            </a:extLst>
-          </p:cNvPr>
-          <p:cNvSpPr txBox="1"/>
-          <p:nvPr/>
-        </p:nvSpPr>
-        <p:spPr>
-          <a:xfrm>
-            <a:off x="4960762" y="3539822"/>
-            <a:ext cx="2269341" cy="1200329"/>
-          </a:xfrm>
-          <a:prstGeom prst="rect">
-            <a:avLst/>
-          </a:prstGeom>
-          <a:noFill/>
-        </p:spPr>
-        <p:txBody>
-          <a:bodyPr wrap="square" rtlCol="0">
-            <a:spAutoFit/>
-          </a:bodyPr>
-          <a:lstStyle/>
-          <a:p>
-            <a:pPr marL="285750" indent="-285750" algn="ctr">
-              <a:buFont typeface="Arial" panose="020B0604020202020204" pitchFamily="34" charset="0"/>
-              <a:buChar char="•"/>
-            </a:pPr>
-            <a:r>
-              <a:rPr lang="pt-BR" dirty="0">
-                <a:solidFill>
-                  <a:schemeClr val="bg1"/>
-                </a:solidFill>
-                <a:latin typeface="Exo 2"/>
-              </a:rPr>
-              <a:t>Embora não fosse uma tarefa de meu gosto eu tinha que entregar.</a:t>
-            </a:r>
-          </a:p>
-        </p:txBody>
-      </p:sp>
-      <p:sp>
-        <p:nvSpPr>
-          <p:cNvPr id="17" name="CaixaDeTexto 16">
-            <a:extLst>
-              <a:ext uri="{FF2B5EF4-FFF2-40B4-BE49-F238E27FC236}">
-                <a16:creationId xmlns:a16="http://schemas.microsoft.com/office/drawing/2014/main" id="{3799AC39-8073-40BC-BEE1-F8852F55530D}"/>
-              </a:ext>
-            </a:extLst>
-          </p:cNvPr>
-          <p:cNvSpPr txBox="1"/>
-          <p:nvPr/>
-        </p:nvSpPr>
-        <p:spPr>
-          <a:xfrm>
-            <a:off x="7540111" y="3466290"/>
-            <a:ext cx="2269341" cy="1477328"/>
-          </a:xfrm>
-          <a:prstGeom prst="rect">
-            <a:avLst/>
-          </a:prstGeom>
-          <a:noFill/>
-        </p:spPr>
-        <p:txBody>
-          <a:bodyPr wrap="square" rtlCol="0">
-            <a:spAutoFit/>
-          </a:bodyPr>
-          <a:lstStyle/>
-          <a:p>
-            <a:pPr marL="285750" indent="-285750" algn="ctr">
-              <a:buFont typeface="Arial" panose="020B0604020202020204" pitchFamily="34" charset="0"/>
-              <a:buChar char="•"/>
-            </a:pPr>
-            <a:r>
-              <a:rPr lang="pt-BR" dirty="0">
-                <a:solidFill>
-                  <a:schemeClr val="bg1"/>
-                </a:solidFill>
-                <a:latin typeface="Exo 2"/>
-              </a:rPr>
-              <a:t>Tive que lidar com o detalhismo que tenho;</a:t>
-            </a:r>
-          </a:p>
-          <a:p>
-            <a:pPr marL="285750" indent="-285750" algn="ctr">
-              <a:buFont typeface="Arial" panose="020B0604020202020204" pitchFamily="34" charset="0"/>
-              <a:buChar char="•"/>
-            </a:pPr>
-            <a:r>
-              <a:rPr lang="pt-BR" dirty="0">
-                <a:solidFill>
-                  <a:schemeClr val="bg1"/>
-                </a:solidFill>
-                <a:latin typeface="Exo 2"/>
-              </a:rPr>
-              <a:t>Madrugar diversas vezes.</a:t>
-            </a:r>
-          </a:p>
-        </p:txBody>
-      </p:sp>
+              </a:endParaRPr>
+            </a:p>
+            <a:p>
+              <a:pPr marL="285750" indent="-285750">
+                <a:buFont typeface="Arial" panose="020B0604020202020204" pitchFamily="34" charset="0"/>
+                <a:buChar char="•"/>
+              </a:pPr>
+              <a:r>
+                <a:rPr lang="pt-BR" dirty="0">
+                  <a:solidFill>
+                    <a:schemeClr val="bg1"/>
+                  </a:solidFill>
+                  <a:latin typeface="Exo 2"/>
+                </a:rPr>
+                <a:t>Não gosto de lidar </a:t>
+              </a:r>
+            </a:p>
+            <a:p>
+              <a:r>
+                <a:rPr lang="pt-BR" dirty="0">
+                  <a:solidFill>
+                    <a:schemeClr val="bg1"/>
+                  </a:solidFill>
+                  <a:latin typeface="Exo 2"/>
+                </a:rPr>
+                <a:t>      com sites.</a:t>
+              </a:r>
+            </a:p>
+          </p:txBody>
+        </p:sp>
+        <p:sp>
+          <p:nvSpPr>
+            <p:cNvPr id="16" name="CaixaDeTexto 15">
+              <a:extLst>
+                <a:ext uri="{FF2B5EF4-FFF2-40B4-BE49-F238E27FC236}">
+                  <a16:creationId xmlns:a16="http://schemas.microsoft.com/office/drawing/2014/main" id="{FD6D2A53-BE29-47EB-91DC-1C24219FFECD}"/>
+                </a:ext>
+              </a:extLst>
+            </p:cNvPr>
+            <p:cNvSpPr txBox="1"/>
+            <p:nvPr/>
+          </p:nvSpPr>
+          <p:spPr>
+            <a:xfrm>
+              <a:off x="4901221" y="4002418"/>
+              <a:ext cx="2269341" cy="1200329"/>
+            </a:xfrm>
+            <a:prstGeom prst="rect">
+              <a:avLst/>
+            </a:prstGeom>
+            <a:noFill/>
+          </p:spPr>
+          <p:txBody>
+            <a:bodyPr wrap="square" rtlCol="0">
+              <a:spAutoFit/>
+            </a:bodyPr>
+            <a:lstStyle/>
+            <a:p>
+              <a:pPr marL="285750" indent="-285750" algn="ctr">
+                <a:buFont typeface="Arial" panose="020B0604020202020204" pitchFamily="34" charset="0"/>
+                <a:buChar char="•"/>
+              </a:pPr>
+              <a:r>
+                <a:rPr lang="pt-BR" dirty="0">
+                  <a:solidFill>
+                    <a:schemeClr val="bg1"/>
+                  </a:solidFill>
+                  <a:latin typeface="Exo 2"/>
+                </a:rPr>
+                <a:t>Embora não fosse uma tarefa de meu gosto eu tinha que entregar.</a:t>
+              </a:r>
+            </a:p>
+          </p:txBody>
+        </p:sp>
+        <p:sp>
+          <p:nvSpPr>
+            <p:cNvPr id="17" name="CaixaDeTexto 16">
+              <a:extLst>
+                <a:ext uri="{FF2B5EF4-FFF2-40B4-BE49-F238E27FC236}">
+                  <a16:creationId xmlns:a16="http://schemas.microsoft.com/office/drawing/2014/main" id="{3799AC39-8073-40BC-BEE1-F8852F55530D}"/>
+                </a:ext>
+              </a:extLst>
+            </p:cNvPr>
+            <p:cNvSpPr txBox="1"/>
+            <p:nvPr/>
+          </p:nvSpPr>
+          <p:spPr>
+            <a:xfrm>
+              <a:off x="7480570" y="3928886"/>
+              <a:ext cx="2269341" cy="1477328"/>
+            </a:xfrm>
+            <a:prstGeom prst="rect">
+              <a:avLst/>
+            </a:prstGeom>
+            <a:noFill/>
+          </p:spPr>
+          <p:txBody>
+            <a:bodyPr wrap="square" rtlCol="0">
+              <a:spAutoFit/>
+            </a:bodyPr>
+            <a:lstStyle/>
+            <a:p>
+              <a:pPr marL="285750" indent="-285750" algn="ctr">
+                <a:buFont typeface="Arial" panose="020B0604020202020204" pitchFamily="34" charset="0"/>
+                <a:buChar char="•"/>
+              </a:pPr>
+              <a:r>
+                <a:rPr lang="pt-BR" dirty="0">
+                  <a:solidFill>
+                    <a:schemeClr val="bg1"/>
+                  </a:solidFill>
+                  <a:latin typeface="Exo 2"/>
+                </a:rPr>
+                <a:t>Tive que lidar com o detalhismo que tenho;</a:t>
+              </a:r>
+            </a:p>
+            <a:p>
+              <a:pPr marL="285750" indent="-285750" algn="ctr">
+                <a:buFont typeface="Arial" panose="020B0604020202020204" pitchFamily="34" charset="0"/>
+                <a:buChar char="•"/>
+              </a:pPr>
+              <a:r>
+                <a:rPr lang="pt-BR" dirty="0">
+                  <a:solidFill>
+                    <a:schemeClr val="bg1"/>
+                  </a:solidFill>
+                  <a:latin typeface="Exo 2"/>
+                </a:rPr>
+                <a:t>Madrugar diversas vezes.</a:t>
+              </a:r>
+            </a:p>
+          </p:txBody>
+        </p:sp>
+      </p:grpSp>
     </p:spTree>
     <p:extLst>
       <p:ext uri="{BB962C8B-B14F-4D97-AF65-F5344CB8AC3E}">
@@ -7272,10 +7866,10 @@
       </p:grpSpPr>
       <p:sp>
         <p:nvSpPr>
-          <p:cNvPr id="2" name="Triângulo Retângulo 1">
-            <a:extLst>
-              <a:ext uri="{FF2B5EF4-FFF2-40B4-BE49-F238E27FC236}">
-                <a16:creationId xmlns:a16="http://schemas.microsoft.com/office/drawing/2014/main" id="{93E4C6F9-0A88-4315-9D6C-A0DE3617C972}"/>
+          <p:cNvPr id="2" name="Retângulo: Cantos Arredondados 1">
+            <a:extLst>
+              <a:ext uri="{FF2B5EF4-FFF2-40B4-BE49-F238E27FC236}">
+                <a16:creationId xmlns:a16="http://schemas.microsoft.com/office/drawing/2014/main" id="{7A0840B0-F078-40AC-B8AB-EA28662FF564}"/>
               </a:ext>
             </a:extLst>
           </p:cNvPr>
@@ -7284,20 +7878,181 @@
         </p:nvSpPr>
         <p:spPr>
           <a:xfrm>
-            <a:off x="-241300" y="4559300"/>
-            <a:ext cx="2425700" cy="2413000"/>
+            <a:off x="693419" y="452629"/>
+            <a:ext cx="10805159" cy="5943600"/>
           </a:xfrm>
-          <a:prstGeom prst="rtTriangle">
+          <a:prstGeom prst="roundRect">
             <a:avLst/>
           </a:prstGeom>
           <a:pattFill prst="weave">
             <a:fgClr>
-              <a:srgbClr val="203115"/>
+              <a:srgbClr val="213216"/>
             </a:fgClr>
             <a:bgClr>
-              <a:srgbClr val="0E1509"/>
+              <a:schemeClr val="tx1">
+                <a:lumMod val="95000"/>
+                <a:lumOff val="5000"/>
+              </a:schemeClr>
             </a:bgClr>
           </a:pattFill>
+          <a:ln w="28575">
+            <a:solidFill>
+              <a:schemeClr val="accent6">
+                <a:lumMod val="75000"/>
+              </a:schemeClr>
+            </a:solidFill>
+          </a:ln>
+        </p:spPr>
+        <p:style>
+          <a:lnRef idx="2">
+            <a:schemeClr val="dk1">
+              <a:shade val="50000"/>
+            </a:schemeClr>
+          </a:lnRef>
+          <a:fillRef idx="1">
+            <a:schemeClr val="dk1"/>
+          </a:fillRef>
+          <a:effectRef idx="0">
+            <a:schemeClr val="dk1"/>
+          </a:effectRef>
+          <a:fontRef idx="minor">
+            <a:schemeClr val="lt1"/>
+          </a:fontRef>
+        </p:style>
+        <p:txBody>
+          <a:bodyPr rtlCol="0" anchor="ctr"/>
+          <a:lstStyle/>
+          <a:p>
+            <a:pPr algn="ctr"/>
+            <a:endParaRPr lang="pt-BR" dirty="0"/>
+          </a:p>
+        </p:txBody>
+      </p:sp>
+      <p:sp>
+        <p:nvSpPr>
+          <p:cNvPr id="5" name="Retângulo: Cantos Arredondados 4">
+            <a:extLst>
+              <a:ext uri="{FF2B5EF4-FFF2-40B4-BE49-F238E27FC236}">
+                <a16:creationId xmlns:a16="http://schemas.microsoft.com/office/drawing/2014/main" id="{D6BFFF27-7540-4BB3-AA2F-15476A01A6C0}"/>
+              </a:ext>
+            </a:extLst>
+          </p:cNvPr>
+          <p:cNvSpPr/>
+          <p:nvPr/>
+        </p:nvSpPr>
+        <p:spPr>
+          <a:xfrm>
+            <a:off x="3999707" y="2160640"/>
+            <a:ext cx="4124014" cy="630942"/>
+          </a:xfrm>
+          <a:prstGeom prst="roundRect">
+            <a:avLst/>
+          </a:prstGeom>
+          <a:solidFill>
+            <a:schemeClr val="tx1">
+              <a:lumMod val="95000"/>
+              <a:lumOff val="5000"/>
+            </a:schemeClr>
+          </a:solidFill>
+          <a:ln w="28575">
+            <a:solidFill>
+              <a:schemeClr val="accent6">
+                <a:lumMod val="75000"/>
+              </a:schemeClr>
+            </a:solidFill>
+          </a:ln>
+        </p:spPr>
+        <p:style>
+          <a:lnRef idx="2">
+            <a:schemeClr val="dk1">
+              <a:shade val="50000"/>
+            </a:schemeClr>
+          </a:lnRef>
+          <a:fillRef idx="1">
+            <a:schemeClr val="dk1"/>
+          </a:fillRef>
+          <a:effectRef idx="0">
+            <a:schemeClr val="dk1"/>
+          </a:effectRef>
+          <a:fontRef idx="minor">
+            <a:schemeClr val="lt1"/>
+          </a:fontRef>
+        </p:style>
+        <p:txBody>
+          <a:bodyPr rtlCol="0" anchor="ctr"/>
+          <a:lstStyle/>
+          <a:p>
+            <a:pPr algn="ctr"/>
+            <a:endParaRPr lang="pt-BR"/>
+          </a:p>
+        </p:txBody>
+      </p:sp>
+      <p:sp>
+        <p:nvSpPr>
+          <p:cNvPr id="3" name="CaixaDeTexto 2">
+            <a:extLst>
+              <a:ext uri="{FF2B5EF4-FFF2-40B4-BE49-F238E27FC236}">
+                <a16:creationId xmlns:a16="http://schemas.microsoft.com/office/drawing/2014/main" id="{CF4C4B3D-02F3-4A0D-BE42-5490FDDAA7F0}"/>
+              </a:ext>
+            </a:extLst>
+          </p:cNvPr>
+          <p:cNvSpPr txBox="1"/>
+          <p:nvPr/>
+        </p:nvSpPr>
+        <p:spPr>
+          <a:xfrm>
+            <a:off x="4016848" y="2110322"/>
+            <a:ext cx="4124014" cy="630942"/>
+          </a:xfrm>
+          <a:prstGeom prst="rect">
+            <a:avLst/>
+          </a:prstGeom>
+          <a:noFill/>
+        </p:spPr>
+        <p:txBody>
+          <a:bodyPr wrap="none" rtlCol="0">
+            <a:spAutoFit/>
+          </a:bodyPr>
+          <a:lstStyle/>
+          <a:p>
+            <a:r>
+              <a:rPr lang="pt-BR" sz="3500" b="1" dirty="0">
+                <a:solidFill>
+                  <a:schemeClr val="bg1"/>
+                </a:solidFill>
+                <a:latin typeface="Exo 2"/>
+              </a:rPr>
+              <a:t>Apresentação do Site</a:t>
+            </a:r>
+          </a:p>
+        </p:txBody>
+      </p:sp>
+      <p:sp>
+        <p:nvSpPr>
+          <p:cNvPr id="6" name="Retângulo 5">
+            <a:extLst>
+              <a:ext uri="{FF2B5EF4-FFF2-40B4-BE49-F238E27FC236}">
+                <a16:creationId xmlns:a16="http://schemas.microsoft.com/office/drawing/2014/main" id="{65FBBA06-0FE9-45FF-9F74-63981BD7ED05}"/>
+              </a:ext>
+            </a:extLst>
+          </p:cNvPr>
+          <p:cNvSpPr/>
+          <p:nvPr/>
+        </p:nvSpPr>
+        <p:spPr>
+          <a:xfrm>
+            <a:off x="5078730" y="3072009"/>
+            <a:ext cx="2034540" cy="1988820"/>
+          </a:xfrm>
+          <a:prstGeom prst="rect">
+            <a:avLst/>
+          </a:prstGeom>
+          <a:solidFill>
+            <a:schemeClr val="tx1">
+              <a:lumMod val="95000"/>
+              <a:lumOff val="5000"/>
+            </a:schemeClr>
+          </a:solidFill>
           <a:ln w="28575">
             <a:solidFill>
               <a:schemeClr val="accent6">
@@ -7331,247 +8086,57 @@
           </a:p>
         </p:txBody>
       </p:sp>
-      <p:sp>
-        <p:nvSpPr>
-          <p:cNvPr id="3" name="Triângulo Retângulo 2">
-            <a:extLst>
-              <a:ext uri="{FF2B5EF4-FFF2-40B4-BE49-F238E27FC236}">
-                <a16:creationId xmlns:a16="http://schemas.microsoft.com/office/drawing/2014/main" id="{3DD7CF32-C84E-4C4A-BF15-F5E21F90B3D9}"/>
-              </a:ext>
-            </a:extLst>
-          </p:cNvPr>
-          <p:cNvSpPr/>
+      <p:pic>
+        <p:nvPicPr>
+          <p:cNvPr id="1026" name="Picture 2" descr="Página Vector ícone, Web Icon, O ícone Do Navegador, Web Icon Imagem PNG e  Vetor Para Download Gratuito">
+            <a:extLst>
+              <a:ext uri="{FF2B5EF4-FFF2-40B4-BE49-F238E27FC236}">
+                <a16:creationId xmlns:a16="http://schemas.microsoft.com/office/drawing/2014/main" id="{96F673F8-7882-4B50-9010-F7F9696AABB1}"/>
+              </a:ext>
+            </a:extLst>
+          </p:cNvPr>
+          <p:cNvPicPr>
+            <a:picLocks noChangeAspect="1" noChangeArrowheads="1"/>
+          </p:cNvPicPr>
           <p:nvPr/>
-        </p:nvSpPr>
-        <p:spPr>
-          <a:xfrm rot="5400000">
-            <a:off x="-247650" y="-120650"/>
-            <a:ext cx="2425700" cy="2413000"/>
+        </p:nvPicPr>
+        <p:blipFill>
+          <a:blip r:embed="rId3">
+            <a:extLst>
+              <a:ext uri="{28A0092B-C50C-407E-A947-70E740481C1C}">
+                <a14:useLocalDpi xmlns:a14="http://schemas.microsoft.com/office/drawing/2010/main" val="0"/>
+              </a:ext>
+            </a:extLst>
+          </a:blip>
+          <a:srcRect/>
+          <a:stretch>
+            <a:fillRect/>
+          </a:stretch>
+        </p:blipFill>
+        <p:spPr bwMode="auto">
+          <a:xfrm>
+            <a:off x="5255893" y="3207646"/>
+            <a:ext cx="1714500" cy="1714500"/>
           </a:xfrm>
-          <a:prstGeom prst="rtTriangle">
+          <a:prstGeom prst="rect">
             <a:avLst/>
           </a:prstGeom>
-          <a:pattFill prst="weave">
-            <a:fgClr>
-              <a:srgbClr val="203115"/>
-            </a:fgClr>
-            <a:bgClr>
-              <a:srgbClr val="0E1509"/>
-            </a:bgClr>
-          </a:pattFill>
-          <a:ln w="28575">
-            <a:solidFill>
-              <a:schemeClr val="accent6">
-                <a:lumMod val="75000"/>
-              </a:schemeClr>
-            </a:solidFill>
-          </a:ln>
+          <a:noFill/>
+          <a:extLst>
+            <a:ext uri="{909E8E84-426E-40DD-AFC4-6F175D3DCCD1}">
+              <a14:hiddenFill xmlns:a14="http://schemas.microsoft.com/office/drawing/2010/main">
+                <a:solidFill>
+                  <a:srgbClr val="FFFFFF"/>
+                </a:solidFill>
+              </a14:hiddenFill>
+            </a:ext>
+          </a:extLst>
         </p:spPr>
-        <p:style>
-          <a:lnRef idx="2">
-            <a:schemeClr val="accent1">
-              <a:shade val="50000"/>
-            </a:schemeClr>
-          </a:lnRef>
-          <a:fillRef idx="1">
-            <a:schemeClr val="accent1"/>
-          </a:fillRef>
-          <a:effectRef idx="0">
-            <a:schemeClr val="accent1"/>
-          </a:effectRef>
-          <a:fontRef idx="minor">
-            <a:schemeClr val="lt1"/>
-          </a:fontRef>
-        </p:style>
-        <p:txBody>
-          <a:bodyPr rtlCol="0" anchor="ctr"/>
-          <a:lstStyle/>
-          <a:p>
-            <a:pPr algn="ctr"/>
-            <a:endParaRPr lang="pt-BR"/>
-          </a:p>
-        </p:txBody>
-      </p:sp>
-      <p:sp>
-        <p:nvSpPr>
-          <p:cNvPr id="4" name="Triângulo Retângulo 3">
-            <a:extLst>
-              <a:ext uri="{FF2B5EF4-FFF2-40B4-BE49-F238E27FC236}">
-                <a16:creationId xmlns:a16="http://schemas.microsoft.com/office/drawing/2014/main" id="{332A6D9D-86E7-440D-8038-CC15348EEA92}"/>
-              </a:ext>
-            </a:extLst>
-          </p:cNvPr>
-          <p:cNvSpPr/>
-          <p:nvPr/>
-        </p:nvSpPr>
-        <p:spPr>
-          <a:xfrm rot="16200000">
-            <a:off x="9886950" y="4552950"/>
-            <a:ext cx="2425700" cy="2413000"/>
-          </a:xfrm>
-          <a:prstGeom prst="rtTriangle">
-            <a:avLst/>
-          </a:prstGeom>
-          <a:pattFill prst="weave">
-            <a:fgClr>
-              <a:srgbClr val="203115"/>
-            </a:fgClr>
-            <a:bgClr>
-              <a:srgbClr val="0E1509"/>
-            </a:bgClr>
-          </a:pattFill>
-          <a:ln w="28575">
-            <a:solidFill>
-              <a:schemeClr val="accent6">
-                <a:lumMod val="75000"/>
-              </a:schemeClr>
-            </a:solidFill>
-          </a:ln>
-        </p:spPr>
-        <p:style>
-          <a:lnRef idx="2">
-            <a:schemeClr val="accent1">
-              <a:shade val="50000"/>
-            </a:schemeClr>
-          </a:lnRef>
-          <a:fillRef idx="1">
-            <a:schemeClr val="accent1"/>
-          </a:fillRef>
-          <a:effectRef idx="0">
-            <a:schemeClr val="accent1"/>
-          </a:effectRef>
-          <a:fontRef idx="minor">
-            <a:schemeClr val="lt1"/>
-          </a:fontRef>
-        </p:style>
-        <p:txBody>
-          <a:bodyPr rtlCol="0" anchor="ctr"/>
-          <a:lstStyle/>
-          <a:p>
-            <a:pPr algn="ctr"/>
-            <a:endParaRPr lang="pt-BR"/>
-          </a:p>
-        </p:txBody>
-      </p:sp>
-      <p:sp>
-        <p:nvSpPr>
-          <p:cNvPr id="5" name="Triângulo Retângulo 4">
-            <a:extLst>
-              <a:ext uri="{FF2B5EF4-FFF2-40B4-BE49-F238E27FC236}">
-                <a16:creationId xmlns:a16="http://schemas.microsoft.com/office/drawing/2014/main" id="{A25B2007-EF8D-4155-96E7-8F00A999867B}"/>
-              </a:ext>
-            </a:extLst>
-          </p:cNvPr>
-          <p:cNvSpPr/>
-          <p:nvPr/>
-        </p:nvSpPr>
-        <p:spPr>
-          <a:xfrm rot="10800000">
-            <a:off x="9880600" y="-127001"/>
-            <a:ext cx="2425700" cy="2413000"/>
-          </a:xfrm>
-          <a:prstGeom prst="rtTriangle">
-            <a:avLst/>
-          </a:prstGeom>
-          <a:pattFill prst="weave">
-            <a:fgClr>
-              <a:srgbClr val="203115"/>
-            </a:fgClr>
-            <a:bgClr>
-              <a:srgbClr val="0E1509"/>
-            </a:bgClr>
-          </a:pattFill>
-          <a:ln w="28575">
-            <a:solidFill>
-              <a:schemeClr val="accent6">
-                <a:lumMod val="75000"/>
-              </a:schemeClr>
-            </a:solidFill>
-          </a:ln>
-        </p:spPr>
-        <p:style>
-          <a:lnRef idx="2">
-            <a:schemeClr val="accent1">
-              <a:shade val="50000"/>
-            </a:schemeClr>
-          </a:lnRef>
-          <a:fillRef idx="1">
-            <a:schemeClr val="accent1"/>
-          </a:fillRef>
-          <a:effectRef idx="0">
-            <a:schemeClr val="accent1"/>
-          </a:effectRef>
-          <a:fontRef idx="minor">
-            <a:schemeClr val="lt1"/>
-          </a:fontRef>
-        </p:style>
-        <p:txBody>
-          <a:bodyPr rtlCol="0" anchor="ctr"/>
-          <a:lstStyle/>
-          <a:p>
-            <a:pPr algn="ctr"/>
-            <a:endParaRPr lang="pt-BR"/>
-          </a:p>
-        </p:txBody>
-      </p:sp>
-      <p:sp>
-        <p:nvSpPr>
-          <p:cNvPr id="6" name="Losango 5">
-            <a:extLst>
-              <a:ext uri="{FF2B5EF4-FFF2-40B4-BE49-F238E27FC236}">
-                <a16:creationId xmlns:a16="http://schemas.microsoft.com/office/drawing/2014/main" id="{4AF32721-5DBF-4465-BCB3-C80401564B54}"/>
-              </a:ext>
-            </a:extLst>
-          </p:cNvPr>
-          <p:cNvSpPr/>
-          <p:nvPr/>
-        </p:nvSpPr>
-        <p:spPr>
-          <a:xfrm>
-            <a:off x="-2074607" y="-390832"/>
-            <a:ext cx="16341213" cy="7639664"/>
-          </a:xfrm>
-          <a:prstGeom prst="diamond">
-            <a:avLst/>
-          </a:prstGeom>
-          <a:pattFill prst="weave">
-            <a:fgClr>
-              <a:srgbClr val="203115"/>
-            </a:fgClr>
-            <a:bgClr>
-              <a:srgbClr val="0E1509"/>
-            </a:bgClr>
-          </a:pattFill>
-        </p:spPr>
-        <p:style>
-          <a:lnRef idx="2">
-            <a:schemeClr val="accent1">
-              <a:shade val="50000"/>
-            </a:schemeClr>
-          </a:lnRef>
-          <a:fillRef idx="1">
-            <a:schemeClr val="accent1"/>
-          </a:fillRef>
-          <a:effectRef idx="0">
-            <a:schemeClr val="accent1"/>
-          </a:effectRef>
-          <a:fontRef idx="minor">
-            <a:schemeClr val="lt1"/>
-          </a:fontRef>
-        </p:style>
-        <p:txBody>
-          <a:bodyPr rtlCol="0" anchor="ctr"/>
-          <a:lstStyle/>
-          <a:p>
-            <a:pPr algn="ctr"/>
-            <a:endParaRPr lang="pt-BR"/>
-          </a:p>
-        </p:txBody>
-      </p:sp>
+      </p:pic>
     </p:spTree>
     <p:extLst>
       <p:ext uri="{BB962C8B-B14F-4D97-AF65-F5344CB8AC3E}">
-        <p14:creationId xmlns:p14="http://schemas.microsoft.com/office/powerpoint/2010/main" val="173856952"/>
+        <p14:creationId xmlns:p14="http://schemas.microsoft.com/office/powerpoint/2010/main" val="2093475426"/>
       </p:ext>
     </p:extLst>
   </p:cSld>
@@ -7613,10 +8178,773 @@
           <a:chExt cx="0" cy="0"/>
         </a:xfrm>
       </p:grpSpPr>
+      <p:sp>
+        <p:nvSpPr>
+          <p:cNvPr id="2" name="Triângulo Retângulo 1">
+            <a:extLst>
+              <a:ext uri="{FF2B5EF4-FFF2-40B4-BE49-F238E27FC236}">
+                <a16:creationId xmlns:a16="http://schemas.microsoft.com/office/drawing/2014/main" id="{93E4C6F9-0A88-4315-9D6C-A0DE3617C972}"/>
+              </a:ext>
+            </a:extLst>
+          </p:cNvPr>
+          <p:cNvSpPr/>
+          <p:nvPr/>
+        </p:nvSpPr>
+        <p:spPr>
+          <a:xfrm>
+            <a:off x="-241300" y="4559300"/>
+            <a:ext cx="2425700" cy="2413000"/>
+          </a:xfrm>
+          <a:prstGeom prst="rtTriangle">
+            <a:avLst/>
+          </a:prstGeom>
+          <a:pattFill prst="weave">
+            <a:fgClr>
+              <a:srgbClr val="203115"/>
+            </a:fgClr>
+            <a:bgClr>
+              <a:srgbClr val="0E1509"/>
+            </a:bgClr>
+          </a:pattFill>
+          <a:ln w="28575">
+            <a:solidFill>
+              <a:schemeClr val="accent6">
+                <a:lumMod val="75000"/>
+              </a:schemeClr>
+            </a:solidFill>
+          </a:ln>
+        </p:spPr>
+        <p:style>
+          <a:lnRef idx="2">
+            <a:schemeClr val="accent1">
+              <a:shade val="50000"/>
+            </a:schemeClr>
+          </a:lnRef>
+          <a:fillRef idx="1">
+            <a:schemeClr val="accent1"/>
+          </a:fillRef>
+          <a:effectRef idx="0">
+            <a:schemeClr val="accent1"/>
+          </a:effectRef>
+          <a:fontRef idx="minor">
+            <a:schemeClr val="lt1"/>
+          </a:fontRef>
+        </p:style>
+        <p:txBody>
+          <a:bodyPr rtlCol="0" anchor="ctr"/>
+          <a:lstStyle/>
+          <a:p>
+            <a:pPr algn="ctr"/>
+            <a:endParaRPr lang="pt-BR"/>
+          </a:p>
+        </p:txBody>
+      </p:sp>
+      <p:sp>
+        <p:nvSpPr>
+          <p:cNvPr id="3" name="Triângulo Retângulo 2">
+            <a:extLst>
+              <a:ext uri="{FF2B5EF4-FFF2-40B4-BE49-F238E27FC236}">
+                <a16:creationId xmlns:a16="http://schemas.microsoft.com/office/drawing/2014/main" id="{3DD7CF32-C84E-4C4A-BF15-F5E21F90B3D9}"/>
+              </a:ext>
+            </a:extLst>
+          </p:cNvPr>
+          <p:cNvSpPr/>
+          <p:nvPr/>
+        </p:nvSpPr>
+        <p:spPr>
+          <a:xfrm rot="5400000">
+            <a:off x="-247650" y="-120650"/>
+            <a:ext cx="2425700" cy="2413000"/>
+          </a:xfrm>
+          <a:prstGeom prst="rtTriangle">
+            <a:avLst/>
+          </a:prstGeom>
+          <a:pattFill prst="weave">
+            <a:fgClr>
+              <a:srgbClr val="203115"/>
+            </a:fgClr>
+            <a:bgClr>
+              <a:srgbClr val="0E1509"/>
+            </a:bgClr>
+          </a:pattFill>
+          <a:ln w="28575">
+            <a:solidFill>
+              <a:schemeClr val="accent6">
+                <a:lumMod val="75000"/>
+              </a:schemeClr>
+            </a:solidFill>
+          </a:ln>
+        </p:spPr>
+        <p:style>
+          <a:lnRef idx="2">
+            <a:schemeClr val="accent1">
+              <a:shade val="50000"/>
+            </a:schemeClr>
+          </a:lnRef>
+          <a:fillRef idx="1">
+            <a:schemeClr val="accent1"/>
+          </a:fillRef>
+          <a:effectRef idx="0">
+            <a:schemeClr val="accent1"/>
+          </a:effectRef>
+          <a:fontRef idx="minor">
+            <a:schemeClr val="lt1"/>
+          </a:fontRef>
+        </p:style>
+        <p:txBody>
+          <a:bodyPr rtlCol="0" anchor="ctr"/>
+          <a:lstStyle/>
+          <a:p>
+            <a:pPr algn="ctr"/>
+            <a:endParaRPr lang="pt-BR"/>
+          </a:p>
+        </p:txBody>
+      </p:sp>
+      <p:sp>
+        <p:nvSpPr>
+          <p:cNvPr id="4" name="Triângulo Retângulo 3">
+            <a:extLst>
+              <a:ext uri="{FF2B5EF4-FFF2-40B4-BE49-F238E27FC236}">
+                <a16:creationId xmlns:a16="http://schemas.microsoft.com/office/drawing/2014/main" id="{332A6D9D-86E7-440D-8038-CC15348EEA92}"/>
+              </a:ext>
+            </a:extLst>
+          </p:cNvPr>
+          <p:cNvSpPr/>
+          <p:nvPr/>
+        </p:nvSpPr>
+        <p:spPr>
+          <a:xfrm rot="16200000">
+            <a:off x="9886950" y="4552950"/>
+            <a:ext cx="2425700" cy="2413000"/>
+          </a:xfrm>
+          <a:prstGeom prst="rtTriangle">
+            <a:avLst/>
+          </a:prstGeom>
+          <a:pattFill prst="weave">
+            <a:fgClr>
+              <a:srgbClr val="203115"/>
+            </a:fgClr>
+            <a:bgClr>
+              <a:srgbClr val="0E1509"/>
+            </a:bgClr>
+          </a:pattFill>
+          <a:ln w="28575">
+            <a:solidFill>
+              <a:schemeClr val="accent6">
+                <a:lumMod val="75000"/>
+              </a:schemeClr>
+            </a:solidFill>
+          </a:ln>
+        </p:spPr>
+        <p:style>
+          <a:lnRef idx="2">
+            <a:schemeClr val="accent1">
+              <a:shade val="50000"/>
+            </a:schemeClr>
+          </a:lnRef>
+          <a:fillRef idx="1">
+            <a:schemeClr val="accent1"/>
+          </a:fillRef>
+          <a:effectRef idx="0">
+            <a:schemeClr val="accent1"/>
+          </a:effectRef>
+          <a:fontRef idx="minor">
+            <a:schemeClr val="lt1"/>
+          </a:fontRef>
+        </p:style>
+        <p:txBody>
+          <a:bodyPr rtlCol="0" anchor="ctr"/>
+          <a:lstStyle/>
+          <a:p>
+            <a:pPr algn="ctr"/>
+            <a:endParaRPr lang="pt-BR"/>
+          </a:p>
+        </p:txBody>
+      </p:sp>
+      <p:sp>
+        <p:nvSpPr>
+          <p:cNvPr id="5" name="Triângulo Retângulo 4">
+            <a:extLst>
+              <a:ext uri="{FF2B5EF4-FFF2-40B4-BE49-F238E27FC236}">
+                <a16:creationId xmlns:a16="http://schemas.microsoft.com/office/drawing/2014/main" id="{A25B2007-EF8D-4155-96E7-8F00A999867B}"/>
+              </a:ext>
+            </a:extLst>
+          </p:cNvPr>
+          <p:cNvSpPr/>
+          <p:nvPr/>
+        </p:nvSpPr>
+        <p:spPr>
+          <a:xfrm rot="10800000">
+            <a:off x="9880600" y="-127001"/>
+            <a:ext cx="2425700" cy="2413000"/>
+          </a:xfrm>
+          <a:prstGeom prst="rtTriangle">
+            <a:avLst/>
+          </a:prstGeom>
+          <a:pattFill prst="weave">
+            <a:fgClr>
+              <a:srgbClr val="203115"/>
+            </a:fgClr>
+            <a:bgClr>
+              <a:srgbClr val="0E1509"/>
+            </a:bgClr>
+          </a:pattFill>
+          <a:ln w="28575">
+            <a:solidFill>
+              <a:schemeClr val="accent6">
+                <a:lumMod val="75000"/>
+              </a:schemeClr>
+            </a:solidFill>
+          </a:ln>
+        </p:spPr>
+        <p:style>
+          <a:lnRef idx="2">
+            <a:schemeClr val="accent1">
+              <a:shade val="50000"/>
+            </a:schemeClr>
+          </a:lnRef>
+          <a:fillRef idx="1">
+            <a:schemeClr val="accent1"/>
+          </a:fillRef>
+          <a:effectRef idx="0">
+            <a:schemeClr val="accent1"/>
+          </a:effectRef>
+          <a:fontRef idx="minor">
+            <a:schemeClr val="lt1"/>
+          </a:fontRef>
+        </p:style>
+        <p:txBody>
+          <a:bodyPr rtlCol="0" anchor="ctr"/>
+          <a:lstStyle/>
+          <a:p>
+            <a:pPr algn="ctr"/>
+            <a:endParaRPr lang="pt-BR"/>
+          </a:p>
+        </p:txBody>
+      </p:sp>
+      <p:sp>
+        <p:nvSpPr>
+          <p:cNvPr id="6" name="Losango 5">
+            <a:extLst>
+              <a:ext uri="{FF2B5EF4-FFF2-40B4-BE49-F238E27FC236}">
+                <a16:creationId xmlns:a16="http://schemas.microsoft.com/office/drawing/2014/main" id="{4AF32721-5DBF-4465-BCB3-C80401564B54}"/>
+              </a:ext>
+            </a:extLst>
+          </p:cNvPr>
+          <p:cNvSpPr/>
+          <p:nvPr/>
+        </p:nvSpPr>
+        <p:spPr>
+          <a:xfrm>
+            <a:off x="-2074607" y="-390832"/>
+            <a:ext cx="16341213" cy="7639664"/>
+          </a:xfrm>
+          <a:prstGeom prst="diamond">
+            <a:avLst/>
+          </a:prstGeom>
+          <a:pattFill prst="weave">
+            <a:fgClr>
+              <a:srgbClr val="203115"/>
+            </a:fgClr>
+            <a:bgClr>
+              <a:srgbClr val="0E1509"/>
+            </a:bgClr>
+          </a:pattFill>
+          <a:ln w="28575">
+            <a:solidFill>
+              <a:schemeClr val="accent6">
+                <a:lumMod val="75000"/>
+              </a:schemeClr>
+            </a:solidFill>
+          </a:ln>
+        </p:spPr>
+        <p:style>
+          <a:lnRef idx="2">
+            <a:schemeClr val="accent1">
+              <a:shade val="50000"/>
+            </a:schemeClr>
+          </a:lnRef>
+          <a:fillRef idx="1">
+            <a:schemeClr val="accent1"/>
+          </a:fillRef>
+          <a:effectRef idx="0">
+            <a:schemeClr val="accent1"/>
+          </a:effectRef>
+          <a:fontRef idx="minor">
+            <a:schemeClr val="lt1"/>
+          </a:fontRef>
+        </p:style>
+        <p:txBody>
+          <a:bodyPr rtlCol="0" anchor="ctr"/>
+          <a:lstStyle/>
+          <a:p>
+            <a:pPr algn="ctr"/>
+            <a:endParaRPr lang="pt-BR"/>
+          </a:p>
+        </p:txBody>
+      </p:sp>
+      <p:sp>
+        <p:nvSpPr>
+          <p:cNvPr id="9" name="Fluxograma: Conector fora de Página 8">
+            <a:extLst>
+              <a:ext uri="{FF2B5EF4-FFF2-40B4-BE49-F238E27FC236}">
+                <a16:creationId xmlns:a16="http://schemas.microsoft.com/office/drawing/2014/main" id="{1A14FE48-B752-4F61-AC39-0504293AC09C}"/>
+              </a:ext>
+            </a:extLst>
+          </p:cNvPr>
+          <p:cNvSpPr/>
+          <p:nvPr/>
+        </p:nvSpPr>
+        <p:spPr>
+          <a:xfrm>
+            <a:off x="3390899" y="1521043"/>
+            <a:ext cx="5410200" cy="3762157"/>
+          </a:xfrm>
+          <a:prstGeom prst="flowChartOffpageConnector">
+            <a:avLst/>
+          </a:prstGeom>
+          <a:solidFill>
+            <a:schemeClr val="tx1">
+              <a:lumMod val="95000"/>
+              <a:lumOff val="5000"/>
+            </a:schemeClr>
+          </a:solidFill>
+          <a:ln w="28575">
+            <a:solidFill>
+              <a:srgbClr val="203115"/>
+            </a:solidFill>
+          </a:ln>
+        </p:spPr>
+        <p:style>
+          <a:lnRef idx="2">
+            <a:schemeClr val="accent1">
+              <a:shade val="50000"/>
+            </a:schemeClr>
+          </a:lnRef>
+          <a:fillRef idx="1">
+            <a:schemeClr val="accent1"/>
+          </a:fillRef>
+          <a:effectRef idx="0">
+            <a:schemeClr val="accent1"/>
+          </a:effectRef>
+          <a:fontRef idx="minor">
+            <a:schemeClr val="lt1"/>
+          </a:fontRef>
+        </p:style>
+        <p:txBody>
+          <a:bodyPr rtlCol="0" anchor="ctr"/>
+          <a:lstStyle/>
+          <a:p>
+            <a:pPr algn="ctr"/>
+            <a:endParaRPr lang="pt-BR"/>
+          </a:p>
+        </p:txBody>
+      </p:sp>
+      <p:sp>
+        <p:nvSpPr>
+          <p:cNvPr id="7" name="CaixaDeTexto 6">
+            <a:extLst>
+              <a:ext uri="{FF2B5EF4-FFF2-40B4-BE49-F238E27FC236}">
+                <a16:creationId xmlns:a16="http://schemas.microsoft.com/office/drawing/2014/main" id="{CF98230C-9FC8-42E6-883C-1E8E8F7F75F8}"/>
+              </a:ext>
+            </a:extLst>
+          </p:cNvPr>
+          <p:cNvSpPr txBox="1"/>
+          <p:nvPr/>
+        </p:nvSpPr>
+        <p:spPr>
+          <a:xfrm>
+            <a:off x="3710067" y="1574800"/>
+            <a:ext cx="4771863" cy="1169551"/>
+          </a:xfrm>
+          <a:prstGeom prst="rect">
+            <a:avLst/>
+          </a:prstGeom>
+          <a:noFill/>
+        </p:spPr>
+        <p:txBody>
+          <a:bodyPr wrap="square" rtlCol="0">
+            <a:spAutoFit/>
+          </a:bodyPr>
+          <a:lstStyle/>
+          <a:p>
+            <a:r>
+              <a:rPr lang="pt-BR" sz="3500" b="1" dirty="0">
+                <a:solidFill>
+                  <a:schemeClr val="accent6">
+                    <a:lumMod val="75000"/>
+                  </a:schemeClr>
+                </a:solidFill>
+                <a:latin typeface="Exo 2"/>
+              </a:rPr>
+              <a:t>Qual a maior superação que tive?</a:t>
+            </a:r>
+          </a:p>
+        </p:txBody>
+      </p:sp>
+      <p:sp>
+        <p:nvSpPr>
+          <p:cNvPr id="8" name="CaixaDeTexto 7">
+            <a:extLst>
+              <a:ext uri="{FF2B5EF4-FFF2-40B4-BE49-F238E27FC236}">
+                <a16:creationId xmlns:a16="http://schemas.microsoft.com/office/drawing/2014/main" id="{EA8E35B1-0AB6-4B02-A8B4-F34495A5F90F}"/>
+              </a:ext>
+            </a:extLst>
+          </p:cNvPr>
+          <p:cNvSpPr txBox="1"/>
+          <p:nvPr/>
+        </p:nvSpPr>
+        <p:spPr>
+          <a:xfrm>
+            <a:off x="3710067" y="2717234"/>
+            <a:ext cx="3840082" cy="1938992"/>
+          </a:xfrm>
+          <a:prstGeom prst="rect">
+            <a:avLst/>
+          </a:prstGeom>
+          <a:noFill/>
+        </p:spPr>
+        <p:txBody>
+          <a:bodyPr wrap="square" rtlCol="0">
+            <a:spAutoFit/>
+          </a:bodyPr>
+          <a:lstStyle/>
+          <a:p>
+            <a:pPr marL="342900" indent="-342900">
+              <a:buFont typeface="Arial" panose="020B0604020202020204" pitchFamily="34" charset="0"/>
+              <a:buChar char="•"/>
+            </a:pPr>
+            <a:r>
+              <a:rPr lang="pt-BR" sz="2400" b="1" dirty="0">
+                <a:solidFill>
+                  <a:schemeClr val="bg1"/>
+                </a:solidFill>
+                <a:latin typeface="Exo 2"/>
+              </a:rPr>
+              <a:t>Não só quanto ao projeto;</a:t>
+            </a:r>
+          </a:p>
+          <a:p>
+            <a:pPr marL="342900" indent="-342900">
+              <a:buFont typeface="Arial" panose="020B0604020202020204" pitchFamily="34" charset="0"/>
+              <a:buChar char="•"/>
+            </a:pPr>
+            <a:r>
+              <a:rPr lang="pt-BR" sz="2400" b="1" dirty="0">
+                <a:solidFill>
+                  <a:schemeClr val="bg1"/>
+                </a:solidFill>
+                <a:latin typeface="Exo 2"/>
+              </a:rPr>
+              <a:t>Sem preguiça;</a:t>
+            </a:r>
+          </a:p>
+          <a:p>
+            <a:pPr marL="342900" indent="-342900">
+              <a:buFont typeface="Arial" panose="020B0604020202020204" pitchFamily="34" charset="0"/>
+              <a:buChar char="•"/>
+            </a:pPr>
+            <a:r>
+              <a:rPr lang="pt-BR" sz="2400" b="1" dirty="0">
+                <a:solidFill>
+                  <a:schemeClr val="bg1"/>
+                </a:solidFill>
+                <a:latin typeface="Exo 2"/>
+              </a:rPr>
+              <a:t>Sem comodidade;</a:t>
+            </a:r>
+          </a:p>
+          <a:p>
+            <a:pPr marL="342900" indent="-342900">
+              <a:buFont typeface="Arial" panose="020B0604020202020204" pitchFamily="34" charset="0"/>
+              <a:buChar char="•"/>
+            </a:pPr>
+            <a:r>
+              <a:rPr lang="pt-BR" sz="2400" b="1" dirty="0">
+                <a:solidFill>
+                  <a:schemeClr val="bg1"/>
+                </a:solidFill>
+                <a:latin typeface="Exo 2"/>
+              </a:rPr>
+              <a:t>Sem mamão com açúcar;</a:t>
+            </a:r>
+          </a:p>
+          <a:p>
+            <a:pPr marL="342900" indent="-342900">
+              <a:buFont typeface="Arial" panose="020B0604020202020204" pitchFamily="34" charset="0"/>
+              <a:buChar char="•"/>
+            </a:pPr>
+            <a:r>
+              <a:rPr lang="pt-BR" sz="2400" b="1" dirty="0">
+                <a:solidFill>
+                  <a:schemeClr val="bg1"/>
+                </a:solidFill>
+                <a:latin typeface="Exo 2"/>
+              </a:rPr>
+              <a:t>Longas vigílias.</a:t>
+            </a:r>
+          </a:p>
+        </p:txBody>
+      </p:sp>
+      <p:sp>
+        <p:nvSpPr>
+          <p:cNvPr id="10" name="Elipse 9">
+            <a:extLst>
+              <a:ext uri="{FF2B5EF4-FFF2-40B4-BE49-F238E27FC236}">
+                <a16:creationId xmlns:a16="http://schemas.microsoft.com/office/drawing/2014/main" id="{69E4FFB6-90FC-4596-BD11-53390EFAA915}"/>
+              </a:ext>
+            </a:extLst>
+          </p:cNvPr>
+          <p:cNvSpPr/>
+          <p:nvPr/>
+        </p:nvSpPr>
+        <p:spPr>
+          <a:xfrm>
+            <a:off x="971550" y="2305649"/>
+            <a:ext cx="2021116" cy="1977119"/>
+          </a:xfrm>
+          <a:prstGeom prst="ellipse">
+            <a:avLst/>
+          </a:prstGeom>
+          <a:solidFill>
+            <a:schemeClr val="tx1">
+              <a:lumMod val="95000"/>
+              <a:lumOff val="5000"/>
+            </a:schemeClr>
+          </a:solidFill>
+          <a:ln w="28575">
+            <a:solidFill>
+              <a:srgbClr val="213216"/>
+            </a:solidFill>
+          </a:ln>
+        </p:spPr>
+        <p:style>
+          <a:lnRef idx="2">
+            <a:schemeClr val="accent1">
+              <a:shade val="50000"/>
+            </a:schemeClr>
+          </a:lnRef>
+          <a:fillRef idx="1">
+            <a:schemeClr val="accent1"/>
+          </a:fillRef>
+          <a:effectRef idx="0">
+            <a:schemeClr val="accent1"/>
+          </a:effectRef>
+          <a:fontRef idx="minor">
+            <a:schemeClr val="lt1"/>
+          </a:fontRef>
+        </p:style>
+        <p:txBody>
+          <a:bodyPr rtlCol="0" anchor="ctr"/>
+          <a:lstStyle/>
+          <a:p>
+            <a:pPr algn="ctr"/>
+            <a:endParaRPr lang="pt-BR"/>
+          </a:p>
+        </p:txBody>
+      </p:sp>
+      <p:pic>
+        <p:nvPicPr>
+          <p:cNvPr id="1026" name="Picture 2" descr="ícone Avatar, lazybones, preguiça, preguiçoso Livre de xmas giveaway :)">
+            <a:extLst>
+              <a:ext uri="{FF2B5EF4-FFF2-40B4-BE49-F238E27FC236}">
+                <a16:creationId xmlns:a16="http://schemas.microsoft.com/office/drawing/2014/main" id="{8A26DA3B-5437-4DA7-951D-A275843DB1E7}"/>
+              </a:ext>
+            </a:extLst>
+          </p:cNvPr>
+          <p:cNvPicPr>
+            <a:picLocks noChangeAspect="1" noChangeArrowheads="1"/>
+          </p:cNvPicPr>
+          <p:nvPr/>
+        </p:nvPicPr>
+        <p:blipFill>
+          <a:blip r:embed="rId3">
+            <a:extLst>
+              <a:ext uri="{BEBA8EAE-BF5A-486C-A8C5-ECC9F3942E4B}">
+                <a14:imgProps xmlns:a14="http://schemas.microsoft.com/office/drawing/2010/main">
+                  <a14:imgLayer r:embed="rId4">
+                    <a14:imgEffect>
+                      <a14:backgroundRemoval t="6222" b="94667" l="6667" r="94667">
+                        <a14:foregroundMark x1="8000" y1="55111" x2="8000" y2="55111"/>
+                        <a14:foregroundMark x1="10667" y1="55111" x2="16000" y2="62667"/>
+                        <a14:foregroundMark x1="10667" y1="46222" x2="14222" y2="58222"/>
+                        <a14:foregroundMark x1="12444" y1="43111" x2="11556" y2="62222"/>
+                        <a14:foregroundMark x1="11111" y1="45333" x2="22222" y2="21333"/>
+                        <a14:foregroundMark x1="22222" y1="21333" x2="37333" y2="14222"/>
+                        <a14:foregroundMark x1="29778" y1="12444" x2="10667" y2="35556"/>
+                        <a14:foregroundMark x1="10667" y1="35556" x2="8889" y2="41778"/>
+                        <a14:foregroundMark x1="8889" y1="45333" x2="8889" y2="57333"/>
+                        <a14:foregroundMark x1="6667" y1="44889" x2="8889" y2="55111"/>
+                        <a14:foregroundMark x1="8889" y1="40444" x2="9333" y2="51111"/>
+                        <a14:foregroundMark x1="9333" y1="43556" x2="11556" y2="61778"/>
+                        <a14:foregroundMark x1="11556" y1="61778" x2="16000" y2="70667"/>
+                        <a14:foregroundMark x1="11556" y1="69333" x2="16444" y2="76889"/>
+                        <a14:foregroundMark x1="15556" y1="76444" x2="35111" y2="88000"/>
+                        <a14:foregroundMark x1="35556" y1="88444" x2="49333" y2="90667"/>
+                        <a14:foregroundMark x1="50222" y1="91111" x2="54222" y2="91556"/>
+                        <a14:foregroundMark x1="57333" y1="91556" x2="57333" y2="91556"/>
+                        <a14:foregroundMark x1="57333" y1="91556" x2="52889" y2="92000"/>
+                        <a14:foregroundMark x1="50222" y1="92444" x2="48444" y2="92444"/>
+                        <a14:foregroundMark x1="48000" y1="92444" x2="48000" y2="92444"/>
+                        <a14:foregroundMark x1="48444" y1="92444" x2="48444" y2="92444"/>
+                        <a14:foregroundMark x1="49333" y1="93333" x2="49333" y2="93333"/>
+                        <a14:foregroundMark x1="49778" y1="94667" x2="49778" y2="94667"/>
+                        <a14:foregroundMark x1="50222" y1="94667" x2="50222" y2="94667"/>
+                        <a14:foregroundMark x1="55111" y1="90222" x2="56889" y2="88000"/>
+                        <a14:foregroundMark x1="60444" y1="85333" x2="80889" y2="72444"/>
+                        <a14:foregroundMark x1="83111" y1="72000" x2="86667" y2="66222"/>
+                        <a14:foregroundMark x1="88889" y1="62667" x2="90222" y2="49778"/>
+                        <a14:foregroundMark x1="90222" y1="52889" x2="87556" y2="61333"/>
+                        <a14:foregroundMark x1="88444" y1="48444" x2="86222" y2="42222"/>
+                        <a14:foregroundMark x1="88000" y1="48444" x2="86667" y2="36444"/>
+                        <a14:foregroundMark x1="89778" y1="44889" x2="88000" y2="25778"/>
+                        <a14:foregroundMark x1="94667" y1="43556" x2="94667" y2="45333"/>
+                        <a14:foregroundMark x1="60889" y1="8444" x2="58667" y2="8000"/>
+                        <a14:foregroundMark x1="50667" y1="7556" x2="50667" y2="7556"/>
+                        <a14:foregroundMark x1="47556" y1="6222" x2="47556" y2="6222"/>
+                      </a14:backgroundRemoval>
+                    </a14:imgEffect>
+                  </a14:imgLayer>
+                </a14:imgProps>
+              </a:ext>
+              <a:ext uri="{28A0092B-C50C-407E-A947-70E740481C1C}">
+                <a14:useLocalDpi xmlns:a14="http://schemas.microsoft.com/office/drawing/2010/main" val="0"/>
+              </a:ext>
+            </a:extLst>
+          </a:blip>
+          <a:srcRect/>
+          <a:stretch>
+            <a:fillRect/>
+          </a:stretch>
+        </p:blipFill>
+        <p:spPr bwMode="auto">
+          <a:xfrm>
+            <a:off x="1058183" y="2370284"/>
+            <a:ext cx="1847850" cy="1847850"/>
+          </a:xfrm>
+          <a:prstGeom prst="rect">
+            <a:avLst/>
+          </a:prstGeom>
+          <a:noFill/>
+          <a:extLst>
+            <a:ext uri="{909E8E84-426E-40DD-AFC4-6F175D3DCCD1}">
+              <a14:hiddenFill xmlns:a14="http://schemas.microsoft.com/office/drawing/2010/main">
+                <a:solidFill>
+                  <a:srgbClr val="FFFFFF"/>
+                </a:solidFill>
+              </a14:hiddenFill>
+            </a:ext>
+          </a:extLst>
+        </p:spPr>
+      </p:pic>
+      <p:sp>
+        <p:nvSpPr>
+          <p:cNvPr id="12" name="Retângulo 11">
+            <a:extLst>
+              <a:ext uri="{FF2B5EF4-FFF2-40B4-BE49-F238E27FC236}">
+                <a16:creationId xmlns:a16="http://schemas.microsoft.com/office/drawing/2014/main" id="{6C53AB11-BC2B-4D3B-90EF-FC451F57B845}"/>
+              </a:ext>
+            </a:extLst>
+          </p:cNvPr>
+          <p:cNvSpPr/>
+          <p:nvPr/>
+        </p:nvSpPr>
+        <p:spPr>
+          <a:xfrm>
+            <a:off x="9058275" y="2128838"/>
+            <a:ext cx="2184400" cy="2089296"/>
+          </a:xfrm>
+          <a:prstGeom prst="rect">
+            <a:avLst/>
+          </a:prstGeom>
+          <a:solidFill>
+            <a:schemeClr val="tx1">
+              <a:lumMod val="95000"/>
+              <a:lumOff val="5000"/>
+            </a:schemeClr>
+          </a:solidFill>
+          <a:ln w="28575">
+            <a:solidFill>
+              <a:srgbClr val="213216"/>
+            </a:solidFill>
+          </a:ln>
+        </p:spPr>
+        <p:style>
+          <a:lnRef idx="2">
+            <a:schemeClr val="accent1">
+              <a:shade val="50000"/>
+            </a:schemeClr>
+          </a:lnRef>
+          <a:fillRef idx="1">
+            <a:schemeClr val="accent1"/>
+          </a:fillRef>
+          <a:effectRef idx="0">
+            <a:schemeClr val="accent1"/>
+          </a:effectRef>
+          <a:fontRef idx="minor">
+            <a:schemeClr val="lt1"/>
+          </a:fontRef>
+        </p:style>
+        <p:txBody>
+          <a:bodyPr rtlCol="0" anchor="ctr"/>
+          <a:lstStyle/>
+          <a:p>
+            <a:pPr algn="ctr"/>
+            <a:endParaRPr lang="pt-BR"/>
+          </a:p>
+        </p:txBody>
+      </p:sp>
+      <p:pic>
+        <p:nvPicPr>
+          <p:cNvPr id="1028" name="Picture 4" descr="COMODIDADE - Grupo CD Negócios">
+            <a:extLst>
+              <a:ext uri="{FF2B5EF4-FFF2-40B4-BE49-F238E27FC236}">
+                <a16:creationId xmlns:a16="http://schemas.microsoft.com/office/drawing/2014/main" id="{E71AC072-A05A-4532-A631-BE94DD567677}"/>
+              </a:ext>
+            </a:extLst>
+          </p:cNvPr>
+          <p:cNvPicPr>
+            <a:picLocks noChangeAspect="1" noChangeArrowheads="1"/>
+          </p:cNvPicPr>
+          <p:nvPr/>
+        </p:nvPicPr>
+        <p:blipFill>
+          <a:blip r:embed="rId5">
+            <a:extLst>
+              <a:ext uri="{28A0092B-C50C-407E-A947-70E740481C1C}">
+                <a14:useLocalDpi xmlns:a14="http://schemas.microsoft.com/office/drawing/2010/main" val="0"/>
+              </a:ext>
+            </a:extLst>
+          </a:blip>
+          <a:srcRect/>
+          <a:stretch>
+            <a:fillRect/>
+          </a:stretch>
+        </p:blipFill>
+        <p:spPr bwMode="auto">
+          <a:xfrm>
+            <a:off x="9207500" y="2217031"/>
+            <a:ext cx="1885950" cy="1885950"/>
+          </a:xfrm>
+          <a:prstGeom prst="rect">
+            <a:avLst/>
+          </a:prstGeom>
+          <a:noFill/>
+          <a:extLst>
+            <a:ext uri="{909E8E84-426E-40DD-AFC4-6F175D3DCCD1}">
+              <a14:hiddenFill xmlns:a14="http://schemas.microsoft.com/office/drawing/2010/main">
+                <a:solidFill>
+                  <a:srgbClr val="FFFFFF"/>
+                </a:solidFill>
+              </a14:hiddenFill>
+            </a:ext>
+          </a:extLst>
+        </p:spPr>
+      </p:pic>
     </p:spTree>
     <p:extLst>
       <p:ext uri="{BB962C8B-B14F-4D97-AF65-F5344CB8AC3E}">
-        <p14:creationId xmlns:p14="http://schemas.microsoft.com/office/powerpoint/2010/main" val="123356292"/>
+        <p14:creationId xmlns:p14="http://schemas.microsoft.com/office/powerpoint/2010/main" val="173856952"/>
       </p:ext>
     </p:extLst>
   </p:cSld>
@@ -7658,10 +8986,937 @@
           <a:chExt cx="0" cy="0"/>
         </a:xfrm>
       </p:grpSpPr>
+      <p:sp>
+        <p:nvSpPr>
+          <p:cNvPr id="2" name="Cruz 1">
+            <a:extLst>
+              <a:ext uri="{FF2B5EF4-FFF2-40B4-BE49-F238E27FC236}">
+                <a16:creationId xmlns:a16="http://schemas.microsoft.com/office/drawing/2014/main" id="{B5842090-0A08-444A-8298-5A8291AC43A0}"/>
+              </a:ext>
+            </a:extLst>
+          </p:cNvPr>
+          <p:cNvSpPr/>
+          <p:nvPr/>
+        </p:nvSpPr>
+        <p:spPr>
+          <a:xfrm>
+            <a:off x="-558800" y="-457200"/>
+            <a:ext cx="13309600" cy="7772400"/>
+          </a:xfrm>
+          <a:prstGeom prst="plus">
+            <a:avLst>
+              <a:gd name="adj" fmla="val 38282"/>
+            </a:avLst>
+          </a:prstGeom>
+          <a:pattFill prst="weave">
+            <a:fgClr>
+              <a:srgbClr val="213216"/>
+            </a:fgClr>
+            <a:bgClr>
+              <a:srgbClr val="0E1509"/>
+            </a:bgClr>
+          </a:pattFill>
+          <a:ln w="28575">
+            <a:solidFill>
+              <a:schemeClr val="accent6">
+                <a:lumMod val="75000"/>
+              </a:schemeClr>
+            </a:solidFill>
+          </a:ln>
+        </p:spPr>
+        <p:style>
+          <a:lnRef idx="2">
+            <a:schemeClr val="accent1">
+              <a:shade val="50000"/>
+            </a:schemeClr>
+          </a:lnRef>
+          <a:fillRef idx="1">
+            <a:schemeClr val="accent1"/>
+          </a:fillRef>
+          <a:effectRef idx="0">
+            <a:schemeClr val="accent1"/>
+          </a:effectRef>
+          <a:fontRef idx="minor">
+            <a:schemeClr val="lt1"/>
+          </a:fontRef>
+        </p:style>
+        <p:txBody>
+          <a:bodyPr rtlCol="0" anchor="ctr"/>
+          <a:lstStyle/>
+          <a:p>
+            <a:pPr algn="ctr"/>
+            <a:endParaRPr lang="pt-BR"/>
+          </a:p>
+        </p:txBody>
+      </p:sp>
+      <p:grpSp>
+        <p:nvGrpSpPr>
+          <p:cNvPr id="7" name="Agrupar 6">
+            <a:extLst>
+              <a:ext uri="{FF2B5EF4-FFF2-40B4-BE49-F238E27FC236}">
+                <a16:creationId xmlns:a16="http://schemas.microsoft.com/office/drawing/2014/main" id="{B020323E-55D7-4C75-B03F-D08FB048C528}"/>
+              </a:ext>
+            </a:extLst>
+          </p:cNvPr>
+          <p:cNvGrpSpPr/>
+          <p:nvPr/>
+        </p:nvGrpSpPr>
+        <p:grpSpPr>
+          <a:xfrm>
+            <a:off x="3308957" y="810131"/>
+            <a:ext cx="5574083" cy="3317369"/>
+            <a:chOff x="3369501" y="1061233"/>
+            <a:chExt cx="5574083" cy="3108543"/>
+          </a:xfrm>
+        </p:grpSpPr>
+        <p:sp>
+          <p:nvSpPr>
+            <p:cNvPr id="5" name="Retângulo 4">
+              <a:extLst>
+                <a:ext uri="{FF2B5EF4-FFF2-40B4-BE49-F238E27FC236}">
+                  <a16:creationId xmlns:a16="http://schemas.microsoft.com/office/drawing/2014/main" id="{3A98E373-3A45-448C-90A7-8A8963CB9C46}"/>
+                </a:ext>
+              </a:extLst>
+            </p:cNvPr>
+            <p:cNvSpPr/>
+            <p:nvPr/>
+          </p:nvSpPr>
+          <p:spPr>
+            <a:xfrm>
+              <a:off x="3369501" y="1061233"/>
+              <a:ext cx="5574083" cy="3108543"/>
+            </a:xfrm>
+            <a:prstGeom prst="rect">
+              <a:avLst/>
+            </a:prstGeom>
+            <a:solidFill>
+              <a:schemeClr val="tx1">
+                <a:lumMod val="95000"/>
+                <a:lumOff val="5000"/>
+              </a:schemeClr>
+            </a:solidFill>
+            <a:ln w="28575">
+              <a:solidFill>
+                <a:schemeClr val="accent6">
+                  <a:lumMod val="75000"/>
+                </a:schemeClr>
+              </a:solidFill>
+            </a:ln>
+          </p:spPr>
+          <p:style>
+            <a:lnRef idx="2">
+              <a:schemeClr val="accent1">
+                <a:shade val="50000"/>
+              </a:schemeClr>
+            </a:lnRef>
+            <a:fillRef idx="1">
+              <a:schemeClr val="accent1"/>
+            </a:fillRef>
+            <a:effectRef idx="0">
+              <a:schemeClr val="accent1"/>
+            </a:effectRef>
+            <a:fontRef idx="minor">
+              <a:schemeClr val="lt1"/>
+            </a:fontRef>
+          </p:style>
+          <p:txBody>
+            <a:bodyPr rtlCol="0" anchor="ctr"/>
+            <a:lstStyle/>
+            <a:p>
+              <a:pPr algn="ctr"/>
+              <a:endParaRPr lang="pt-BR"/>
+            </a:p>
+          </p:txBody>
+        </p:sp>
+        <p:sp>
+          <p:nvSpPr>
+            <p:cNvPr id="3" name="CaixaDeTexto 2">
+              <a:extLst>
+                <a:ext uri="{FF2B5EF4-FFF2-40B4-BE49-F238E27FC236}">
+                  <a16:creationId xmlns:a16="http://schemas.microsoft.com/office/drawing/2014/main" id="{7E96D554-40ED-4991-8F9D-43591C4FBE81}"/>
+                </a:ext>
+              </a:extLst>
+            </p:cNvPr>
+            <p:cNvSpPr txBox="1"/>
+            <p:nvPr/>
+          </p:nvSpPr>
+          <p:spPr>
+            <a:xfrm>
+              <a:off x="3710068" y="1061233"/>
+              <a:ext cx="4771863" cy="1169551"/>
+            </a:xfrm>
+            <a:prstGeom prst="rect">
+              <a:avLst/>
+            </a:prstGeom>
+            <a:noFill/>
+          </p:spPr>
+          <p:txBody>
+            <a:bodyPr wrap="square" rtlCol="0">
+              <a:spAutoFit/>
+            </a:bodyPr>
+            <a:lstStyle/>
+            <a:p>
+              <a:r>
+                <a:rPr lang="pt-BR" sz="3500" b="1" dirty="0">
+                  <a:solidFill>
+                    <a:schemeClr val="accent6">
+                      <a:lumMod val="75000"/>
+                    </a:schemeClr>
+                  </a:solidFill>
+                  <a:latin typeface="Exo 2"/>
+                </a:rPr>
+                <a:t>Qual a maior dificuldade que tive?</a:t>
+              </a:r>
+            </a:p>
+          </p:txBody>
+        </p:sp>
+        <p:sp>
+          <p:nvSpPr>
+            <p:cNvPr id="4" name="CaixaDeTexto 3">
+              <a:extLst>
+                <a:ext uri="{FF2B5EF4-FFF2-40B4-BE49-F238E27FC236}">
+                  <a16:creationId xmlns:a16="http://schemas.microsoft.com/office/drawing/2014/main" id="{E9FB27C5-9807-4AEC-9007-01771333E33C}"/>
+                </a:ext>
+              </a:extLst>
+            </p:cNvPr>
+            <p:cNvSpPr txBox="1"/>
+            <p:nvPr/>
+          </p:nvSpPr>
+          <p:spPr>
+            <a:xfrm>
+              <a:off x="3710067" y="2230784"/>
+              <a:ext cx="5233517" cy="1569660"/>
+            </a:xfrm>
+            <a:prstGeom prst="rect">
+              <a:avLst/>
+            </a:prstGeom>
+            <a:noFill/>
+          </p:spPr>
+          <p:txBody>
+            <a:bodyPr wrap="square" rtlCol="0">
+              <a:spAutoFit/>
+            </a:bodyPr>
+            <a:lstStyle/>
+            <a:p>
+              <a:pPr marL="342900" indent="-342900">
+                <a:buFont typeface="Arial" panose="020B0604020202020204" pitchFamily="34" charset="0"/>
+                <a:buChar char="•"/>
+              </a:pPr>
+              <a:r>
+                <a:rPr lang="pt-BR" sz="2400" b="1" dirty="0">
+                  <a:solidFill>
+                    <a:schemeClr val="bg1"/>
+                  </a:solidFill>
+                  <a:latin typeface="Exo 2"/>
+                </a:rPr>
+                <a:t>Estilizar apropriadamente;</a:t>
+              </a:r>
+            </a:p>
+            <a:p>
+              <a:pPr marL="342900" indent="-342900">
+                <a:buFont typeface="Arial" panose="020B0604020202020204" pitchFamily="34" charset="0"/>
+                <a:buChar char="•"/>
+              </a:pPr>
+              <a:r>
+                <a:rPr lang="pt-BR" sz="2400" b="1" dirty="0">
+                  <a:solidFill>
+                    <a:schemeClr val="bg1"/>
+                  </a:solidFill>
+                  <a:latin typeface="Exo 2"/>
+                </a:rPr>
+                <a:t>Harmonia entre as cores;</a:t>
+              </a:r>
+            </a:p>
+            <a:p>
+              <a:pPr marL="342900" indent="-342900">
+                <a:buFont typeface="Arial" panose="020B0604020202020204" pitchFamily="34" charset="0"/>
+                <a:buChar char="•"/>
+              </a:pPr>
+              <a:r>
+                <a:rPr lang="pt-BR" sz="2400" b="1" dirty="0">
+                  <a:solidFill>
+                    <a:schemeClr val="bg1"/>
+                  </a:solidFill>
+                  <a:latin typeface="Exo 2"/>
+                </a:rPr>
+                <a:t>Aprendi muito errando e arrumando os códigos.</a:t>
+              </a:r>
+            </a:p>
+          </p:txBody>
+        </p:sp>
+      </p:grpSp>
+      <p:sp>
+        <p:nvSpPr>
+          <p:cNvPr id="8" name="Retângulo 7">
+            <a:extLst>
+              <a:ext uri="{FF2B5EF4-FFF2-40B4-BE49-F238E27FC236}">
+                <a16:creationId xmlns:a16="http://schemas.microsoft.com/office/drawing/2014/main" id="{5AAEDD86-6F59-4C14-98AF-3E287D551093}"/>
+              </a:ext>
+            </a:extLst>
+          </p:cNvPr>
+          <p:cNvSpPr/>
+          <p:nvPr/>
+        </p:nvSpPr>
+        <p:spPr>
+          <a:xfrm>
+            <a:off x="4419600" y="4406899"/>
+            <a:ext cx="3200400" cy="1727201"/>
+          </a:xfrm>
+          <a:prstGeom prst="rect">
+            <a:avLst/>
+          </a:prstGeom>
+          <a:solidFill>
+            <a:schemeClr val="tx1">
+              <a:lumMod val="95000"/>
+              <a:lumOff val="5000"/>
+            </a:schemeClr>
+          </a:solidFill>
+          <a:ln w="28575">
+            <a:solidFill>
+              <a:schemeClr val="accent6">
+                <a:lumMod val="75000"/>
+              </a:schemeClr>
+            </a:solidFill>
+          </a:ln>
+        </p:spPr>
+        <p:style>
+          <a:lnRef idx="2">
+            <a:schemeClr val="accent1">
+              <a:shade val="50000"/>
+            </a:schemeClr>
+          </a:lnRef>
+          <a:fillRef idx="1">
+            <a:schemeClr val="accent1"/>
+          </a:fillRef>
+          <a:effectRef idx="0">
+            <a:schemeClr val="accent1"/>
+          </a:effectRef>
+          <a:fontRef idx="minor">
+            <a:schemeClr val="lt1"/>
+          </a:fontRef>
+        </p:style>
+        <p:txBody>
+          <a:bodyPr rtlCol="0" anchor="ctr"/>
+          <a:lstStyle/>
+          <a:p>
+            <a:pPr algn="ctr"/>
+            <a:endParaRPr lang="pt-BR"/>
+          </a:p>
+        </p:txBody>
+      </p:sp>
+      <p:pic>
+        <p:nvPicPr>
+          <p:cNvPr id="2050" name="Picture 2" descr="Rotate And Flip Your Font Awesome Icons - Solid Foundation Web Development">
+            <a:extLst>
+              <a:ext uri="{FF2B5EF4-FFF2-40B4-BE49-F238E27FC236}">
+                <a16:creationId xmlns:a16="http://schemas.microsoft.com/office/drawing/2014/main" id="{5E6FA8CF-3FA9-49AE-92B0-E22867FD7440}"/>
+              </a:ext>
+            </a:extLst>
+          </p:cNvPr>
+          <p:cNvPicPr>
+            <a:picLocks noChangeAspect="1" noChangeArrowheads="1"/>
+          </p:cNvPicPr>
+          <p:nvPr/>
+        </p:nvPicPr>
+        <p:blipFill>
+          <a:blip r:embed="rId3">
+            <a:extLst>
+              <a:ext uri="{28A0092B-C50C-407E-A947-70E740481C1C}">
+                <a14:useLocalDpi xmlns:a14="http://schemas.microsoft.com/office/drawing/2010/main" val="0"/>
+              </a:ext>
+            </a:extLst>
+          </a:blip>
+          <a:srcRect/>
+          <a:stretch>
+            <a:fillRect/>
+          </a:stretch>
+        </p:blipFill>
+        <p:spPr bwMode="auto">
+          <a:xfrm>
+            <a:off x="4540030" y="4516253"/>
+            <a:ext cx="2990850" cy="1533525"/>
+          </a:xfrm>
+          <a:prstGeom prst="rect">
+            <a:avLst/>
+          </a:prstGeom>
+          <a:noFill/>
+          <a:extLst>
+            <a:ext uri="{909E8E84-426E-40DD-AFC4-6F175D3DCCD1}">
+              <a14:hiddenFill xmlns:a14="http://schemas.microsoft.com/office/drawing/2010/main">
+                <a:solidFill>
+                  <a:srgbClr val="FFFFFF"/>
+                </a:solidFill>
+              </a14:hiddenFill>
+            </a:ext>
+          </a:extLst>
+        </p:spPr>
+      </p:pic>
     </p:spTree>
     <p:extLst>
       <p:ext uri="{BB962C8B-B14F-4D97-AF65-F5344CB8AC3E}">
-        <p14:creationId xmlns:p14="http://schemas.microsoft.com/office/powerpoint/2010/main" val="1550397929"/>
+        <p14:creationId xmlns:p14="http://schemas.microsoft.com/office/powerpoint/2010/main" val="123356292"/>
+      </p:ext>
+    </p:extLst>
+  </p:cSld>
+  <p:clrMapOvr>
+    <a:masterClrMapping/>
+  </p:clrMapOvr>
+</p:sld>
+</file>
+
+<file path=ppt/slides/slide9.xml><?xml version="1.0" encoding="utf-8"?>
+<p:sld xmlns:a="http://schemas.openxmlformats.org/drawingml/2006/main" xmlns:r="http://schemas.openxmlformats.org/officeDocument/2006/relationships" xmlns:p="http://schemas.openxmlformats.org/presentationml/2006/main">
+  <p:cSld>
+    <p:bg>
+      <p:bgPr>
+        <a:blipFill dpi="0" rotWithShape="1">
+          <a:blip r:embed="rId2">
+            <a:alphaModFix amt="95000"/>
+            <a:lum/>
+          </a:blip>
+          <a:srcRect/>
+          <a:stretch>
+            <a:fillRect/>
+          </a:stretch>
+        </a:blipFill>
+        <a:effectLst/>
+      </p:bgPr>
+    </p:bg>
+    <p:spTree>
+      <p:nvGrpSpPr>
+        <p:cNvPr id="1" name=""/>
+        <p:cNvGrpSpPr/>
+        <p:nvPr/>
+      </p:nvGrpSpPr>
+      <p:grpSpPr>
+        <a:xfrm>
+          <a:off x="0" y="0"/>
+          <a:ext cx="0" cy="0"/>
+          <a:chOff x="0" y="0"/>
+          <a:chExt cx="0" cy="0"/>
+        </a:xfrm>
+      </p:grpSpPr>
+      <p:sp>
+        <p:nvSpPr>
+          <p:cNvPr id="2" name="Paralelogramo 1">
+            <a:extLst>
+              <a:ext uri="{FF2B5EF4-FFF2-40B4-BE49-F238E27FC236}">
+                <a16:creationId xmlns:a16="http://schemas.microsoft.com/office/drawing/2014/main" id="{317C1609-6C02-48BC-A168-A75C476711FC}"/>
+              </a:ext>
+            </a:extLst>
+          </p:cNvPr>
+          <p:cNvSpPr/>
+          <p:nvPr/>
+        </p:nvSpPr>
+        <p:spPr>
+          <a:xfrm>
+            <a:off x="-1935480" y="-441960"/>
+            <a:ext cx="13228320" cy="7467600"/>
+          </a:xfrm>
+          <a:prstGeom prst="parallelogram">
+            <a:avLst/>
+          </a:prstGeom>
+          <a:pattFill prst="weave">
+            <a:fgClr>
+              <a:srgbClr val="213216"/>
+            </a:fgClr>
+            <a:bgClr>
+              <a:srgbClr val="0E1509"/>
+            </a:bgClr>
+          </a:pattFill>
+          <a:ln>
+            <a:solidFill>
+              <a:schemeClr val="accent6">
+                <a:lumMod val="75000"/>
+              </a:schemeClr>
+            </a:solidFill>
+          </a:ln>
+        </p:spPr>
+        <p:style>
+          <a:lnRef idx="2">
+            <a:schemeClr val="accent1">
+              <a:shade val="50000"/>
+            </a:schemeClr>
+          </a:lnRef>
+          <a:fillRef idx="1">
+            <a:schemeClr val="accent1"/>
+          </a:fillRef>
+          <a:effectRef idx="0">
+            <a:schemeClr val="accent1"/>
+          </a:effectRef>
+          <a:fontRef idx="minor">
+            <a:schemeClr val="lt1"/>
+          </a:fontRef>
+        </p:style>
+        <p:txBody>
+          <a:bodyPr rtlCol="0" anchor="ctr"/>
+          <a:lstStyle/>
+          <a:p>
+            <a:pPr algn="ctr"/>
+            <a:endParaRPr lang="pt-BR"/>
+          </a:p>
+        </p:txBody>
+      </p:sp>
+      <p:sp>
+        <p:nvSpPr>
+          <p:cNvPr id="8" name="Retângulo 7">
+            <a:extLst>
+              <a:ext uri="{FF2B5EF4-FFF2-40B4-BE49-F238E27FC236}">
+                <a16:creationId xmlns:a16="http://schemas.microsoft.com/office/drawing/2014/main" id="{C77079BD-430A-42BE-839D-DC83D8DEB9CB}"/>
+              </a:ext>
+            </a:extLst>
+          </p:cNvPr>
+          <p:cNvSpPr/>
+          <p:nvPr/>
+        </p:nvSpPr>
+        <p:spPr>
+          <a:xfrm>
+            <a:off x="3474720" y="1737360"/>
+            <a:ext cx="4968240" cy="3352800"/>
+          </a:xfrm>
+          <a:prstGeom prst="rect">
+            <a:avLst/>
+          </a:prstGeom>
+          <a:solidFill>
+            <a:schemeClr val="tx1">
+              <a:lumMod val="95000"/>
+              <a:lumOff val="5000"/>
+            </a:schemeClr>
+          </a:solidFill>
+          <a:ln w="28575">
+            <a:solidFill>
+              <a:schemeClr val="accent6">
+                <a:lumMod val="75000"/>
+              </a:schemeClr>
+            </a:solidFill>
+          </a:ln>
+        </p:spPr>
+        <p:style>
+          <a:lnRef idx="2">
+            <a:schemeClr val="accent1">
+              <a:shade val="50000"/>
+            </a:schemeClr>
+          </a:lnRef>
+          <a:fillRef idx="1">
+            <a:schemeClr val="accent1"/>
+          </a:fillRef>
+          <a:effectRef idx="0">
+            <a:schemeClr val="accent1"/>
+          </a:effectRef>
+          <a:fontRef idx="minor">
+            <a:schemeClr val="lt1"/>
+          </a:fontRef>
+        </p:style>
+        <p:txBody>
+          <a:bodyPr rtlCol="0" anchor="ctr"/>
+          <a:lstStyle/>
+          <a:p>
+            <a:pPr algn="ctr"/>
+            <a:endParaRPr lang="pt-BR"/>
+          </a:p>
+        </p:txBody>
+      </p:sp>
+      <p:grpSp>
+        <p:nvGrpSpPr>
+          <p:cNvPr id="9" name="Agrupar 8">
+            <a:extLst>
+              <a:ext uri="{FF2B5EF4-FFF2-40B4-BE49-F238E27FC236}">
+                <a16:creationId xmlns:a16="http://schemas.microsoft.com/office/drawing/2014/main" id="{05F7B190-F3CD-470E-8AEC-A6DDBEDE8B2C}"/>
+              </a:ext>
+            </a:extLst>
+          </p:cNvPr>
+          <p:cNvGrpSpPr/>
+          <p:nvPr/>
+        </p:nvGrpSpPr>
+        <p:grpSpPr>
+          <a:xfrm>
+            <a:off x="4160630" y="1959367"/>
+            <a:ext cx="3870740" cy="2939266"/>
+            <a:chOff x="3169920" y="1093708"/>
+            <a:chExt cx="3870740" cy="2939266"/>
+          </a:xfrm>
+        </p:grpSpPr>
+        <p:sp>
+          <p:nvSpPr>
+            <p:cNvPr id="5" name="CaixaDeTexto 4">
+              <a:extLst>
+                <a:ext uri="{FF2B5EF4-FFF2-40B4-BE49-F238E27FC236}">
+                  <a16:creationId xmlns:a16="http://schemas.microsoft.com/office/drawing/2014/main" id="{F2CFC5C9-780B-4E35-B345-C38AB773C9F1}"/>
+                </a:ext>
+              </a:extLst>
+            </p:cNvPr>
+            <p:cNvSpPr txBox="1"/>
+            <p:nvPr/>
+          </p:nvSpPr>
+          <p:spPr>
+            <a:xfrm>
+              <a:off x="3169920" y="1093708"/>
+              <a:ext cx="3870740" cy="630942"/>
+            </a:xfrm>
+            <a:prstGeom prst="rect">
+              <a:avLst/>
+            </a:prstGeom>
+            <a:noFill/>
+          </p:spPr>
+          <p:txBody>
+            <a:bodyPr wrap="none" rtlCol="0">
+              <a:spAutoFit/>
+            </a:bodyPr>
+            <a:lstStyle/>
+            <a:p>
+              <a:r>
+                <a:rPr lang="pt-BR" sz="3500" b="1" dirty="0">
+                  <a:solidFill>
+                    <a:schemeClr val="accent6">
+                      <a:lumMod val="75000"/>
+                    </a:schemeClr>
+                  </a:solidFill>
+                  <a:latin typeface="Exo 2"/>
+                </a:rPr>
+                <a:t>O por que das cores</a:t>
+              </a:r>
+            </a:p>
+          </p:txBody>
+        </p:sp>
+        <p:sp>
+          <p:nvSpPr>
+            <p:cNvPr id="7" name="CaixaDeTexto 6">
+              <a:extLst>
+                <a:ext uri="{FF2B5EF4-FFF2-40B4-BE49-F238E27FC236}">
+                  <a16:creationId xmlns:a16="http://schemas.microsoft.com/office/drawing/2014/main" id="{E5B419BD-B61D-4D98-8ED1-3AD4BCC64300}"/>
+                </a:ext>
+              </a:extLst>
+            </p:cNvPr>
+            <p:cNvSpPr txBox="1"/>
+            <p:nvPr/>
+          </p:nvSpPr>
+          <p:spPr>
+            <a:xfrm>
+              <a:off x="3169920" y="1724650"/>
+              <a:ext cx="3069366" cy="2308324"/>
+            </a:xfrm>
+            <a:prstGeom prst="rect">
+              <a:avLst/>
+            </a:prstGeom>
+            <a:noFill/>
+          </p:spPr>
+          <p:txBody>
+            <a:bodyPr wrap="none" rtlCol="0">
+              <a:spAutoFit/>
+            </a:bodyPr>
+            <a:lstStyle/>
+            <a:p>
+              <a:pPr marL="457200" indent="-457200">
+                <a:buFont typeface="Arial" panose="020B0604020202020204" pitchFamily="34" charset="0"/>
+                <a:buChar char="•"/>
+              </a:pPr>
+              <a:r>
+                <a:rPr lang="pt-BR" sz="2400" b="1" dirty="0">
+                  <a:solidFill>
+                    <a:schemeClr val="bg1">
+                      <a:lumMod val="65000"/>
+                    </a:schemeClr>
+                  </a:solidFill>
+                  <a:latin typeface="Exo 2"/>
+                </a:rPr>
+                <a:t>Cinza – </a:t>
+              </a:r>
+              <a:r>
+                <a:rPr lang="pt-BR" sz="2400" dirty="0">
+                  <a:solidFill>
+                    <a:schemeClr val="bg1">
+                      <a:lumMod val="65000"/>
+                    </a:schemeClr>
+                  </a:solidFill>
+                  <a:latin typeface="Exo 2"/>
+                </a:rPr>
+                <a:t>Intelecto;</a:t>
+              </a:r>
+            </a:p>
+            <a:p>
+              <a:pPr marL="457200" indent="-457200">
+                <a:buFont typeface="Arial" panose="020B0604020202020204" pitchFamily="34" charset="0"/>
+                <a:buChar char="•"/>
+              </a:pPr>
+              <a:r>
+                <a:rPr lang="pt-BR" sz="2400" b="1" dirty="0">
+                  <a:solidFill>
+                    <a:schemeClr val="tx1">
+                      <a:lumMod val="95000"/>
+                      <a:lumOff val="5000"/>
+                    </a:schemeClr>
+                  </a:solidFill>
+                  <a:effectLst>
+                    <a:glow rad="101600">
+                      <a:schemeClr val="accent6">
+                        <a:satMod val="175000"/>
+                        <a:alpha val="40000"/>
+                      </a:schemeClr>
+                    </a:glow>
+                  </a:effectLst>
+                  <a:latin typeface="Exo 2"/>
+                </a:rPr>
+                <a:t>Preto – Luto;</a:t>
+              </a:r>
+            </a:p>
+            <a:p>
+              <a:pPr marL="457200" indent="-457200">
+                <a:buFont typeface="Arial" panose="020B0604020202020204" pitchFamily="34" charset="0"/>
+                <a:buChar char="•"/>
+              </a:pPr>
+              <a:r>
+                <a:rPr lang="pt-BR" sz="2400" b="1" dirty="0">
+                  <a:solidFill>
+                    <a:schemeClr val="bg1"/>
+                  </a:solidFill>
+                  <a:latin typeface="Exo 2"/>
+                </a:rPr>
+                <a:t>Branco – </a:t>
+              </a:r>
+              <a:r>
+                <a:rPr lang="pt-BR" sz="2400" dirty="0">
+                  <a:solidFill>
+                    <a:schemeClr val="bg1"/>
+                  </a:solidFill>
+                  <a:latin typeface="Exo 2"/>
+                </a:rPr>
+                <a:t>Paz;</a:t>
+              </a:r>
+            </a:p>
+            <a:p>
+              <a:pPr marL="457200" indent="-457200">
+                <a:buFont typeface="Arial" panose="020B0604020202020204" pitchFamily="34" charset="0"/>
+                <a:buChar char="•"/>
+              </a:pPr>
+              <a:r>
+                <a:rPr lang="pt-BR" sz="2400" b="1" dirty="0">
+                  <a:solidFill>
+                    <a:srgbClr val="FF0000"/>
+                  </a:solidFill>
+                  <a:latin typeface="Exo 2"/>
+                </a:rPr>
+                <a:t>Vermelho –</a:t>
+              </a:r>
+              <a:r>
+                <a:rPr lang="pt-BR" sz="2400" dirty="0">
+                  <a:solidFill>
+                    <a:srgbClr val="FF0000"/>
+                  </a:solidFill>
+                  <a:latin typeface="Exo 2"/>
+                </a:rPr>
+                <a:t> Paixão;</a:t>
+              </a:r>
+            </a:p>
+            <a:p>
+              <a:pPr marL="457200" indent="-457200">
+                <a:buFont typeface="Arial" panose="020B0604020202020204" pitchFamily="34" charset="0"/>
+                <a:buChar char="•"/>
+              </a:pPr>
+              <a:r>
+                <a:rPr lang="pt-BR" sz="2400" b="1" dirty="0">
+                  <a:solidFill>
+                    <a:srgbClr val="FFC000"/>
+                  </a:solidFill>
+                  <a:latin typeface="Exo 2"/>
+                </a:rPr>
+                <a:t>Laranja –</a:t>
+              </a:r>
+              <a:r>
+                <a:rPr lang="pt-BR" sz="2400" dirty="0">
+                  <a:solidFill>
+                    <a:srgbClr val="FFC000"/>
+                  </a:solidFill>
+                  <a:latin typeface="Exo 2"/>
+                </a:rPr>
+                <a:t> Alegria;</a:t>
+              </a:r>
+            </a:p>
+            <a:p>
+              <a:pPr marL="457200" indent="-457200">
+                <a:buFont typeface="Arial" panose="020B0604020202020204" pitchFamily="34" charset="0"/>
+                <a:buChar char="•"/>
+              </a:pPr>
+              <a:r>
+                <a:rPr lang="pt-BR" sz="2400" b="1" dirty="0">
+                  <a:solidFill>
+                    <a:schemeClr val="accent6">
+                      <a:lumMod val="75000"/>
+                    </a:schemeClr>
+                  </a:solidFill>
+                  <a:latin typeface="Exo 2"/>
+                </a:rPr>
+                <a:t>Verde –</a:t>
+              </a:r>
+              <a:r>
+                <a:rPr lang="pt-BR" sz="2400" dirty="0">
+                  <a:solidFill>
+                    <a:schemeClr val="accent6">
+                      <a:lumMod val="75000"/>
+                    </a:schemeClr>
+                  </a:solidFill>
+                  <a:latin typeface="Exo 2"/>
+                </a:rPr>
+                <a:t> Esperança.</a:t>
+              </a:r>
+            </a:p>
+          </p:txBody>
+        </p:sp>
+      </p:grpSp>
+      <p:sp>
+        <p:nvSpPr>
+          <p:cNvPr id="12" name="AutoShape 2" descr="Paleta de cores - ícones de ferramentas de edição grátis">
+            <a:extLst>
+              <a:ext uri="{FF2B5EF4-FFF2-40B4-BE49-F238E27FC236}">
+                <a16:creationId xmlns:a16="http://schemas.microsoft.com/office/drawing/2014/main" id="{C3812C84-214E-439F-8E31-6DEB47BE8F47}"/>
+              </a:ext>
+            </a:extLst>
+          </p:cNvPr>
+          <p:cNvSpPr>
+            <a:spLocks noChangeAspect="1" noChangeArrowheads="1"/>
+          </p:cNvSpPr>
+          <p:nvPr/>
+        </p:nvSpPr>
+        <p:spPr bwMode="auto">
+          <a:xfrm>
+            <a:off x="5943600" y="3276600"/>
+            <a:ext cx="304800" cy="304800"/>
+          </a:xfrm>
+          <a:prstGeom prst="rect">
+            <a:avLst/>
+          </a:prstGeom>
+          <a:noFill/>
+          <a:extLst>
+            <a:ext uri="{909E8E84-426E-40DD-AFC4-6F175D3DCCD1}">
+              <a14:hiddenFill xmlns:a14="http://schemas.microsoft.com/office/drawing/2010/main">
+                <a:solidFill>
+                  <a:srgbClr val="FFFFFF"/>
+                </a:solidFill>
+              </a14:hiddenFill>
+            </a:ext>
+          </a:extLst>
+        </p:spPr>
+        <p:txBody>
+          <a:bodyPr vert="horz" wrap="square" lIns="91440" tIns="45720" rIns="91440" bIns="45720" numCol="1" anchor="t" anchorCtr="0" compatLnSpc="1">
+            <a:prstTxWarp prst="textNoShape">
+              <a:avLst/>
+            </a:prstTxWarp>
+          </a:bodyPr>
+          <a:lstStyle/>
+          <a:p>
+            <a:endParaRPr lang="pt-BR"/>
+          </a:p>
+        </p:txBody>
+      </p:sp>
+      <p:sp>
+        <p:nvSpPr>
+          <p:cNvPr id="14" name="Retângulo 13">
+            <a:extLst>
+              <a:ext uri="{FF2B5EF4-FFF2-40B4-BE49-F238E27FC236}">
+                <a16:creationId xmlns:a16="http://schemas.microsoft.com/office/drawing/2014/main" id="{A9140C70-A4A6-423A-80C7-1BB52C837593}"/>
+              </a:ext>
+            </a:extLst>
+          </p:cNvPr>
+          <p:cNvSpPr/>
+          <p:nvPr/>
+        </p:nvSpPr>
+        <p:spPr>
+          <a:xfrm>
+            <a:off x="533400" y="2438400"/>
+            <a:ext cx="1996440" cy="1950720"/>
+          </a:xfrm>
+          <a:prstGeom prst="rect">
+            <a:avLst/>
+          </a:prstGeom>
+          <a:solidFill>
+            <a:schemeClr val="tx1">
+              <a:lumMod val="95000"/>
+              <a:lumOff val="5000"/>
+            </a:schemeClr>
+          </a:solidFill>
+          <a:ln w="28575">
+            <a:solidFill>
+              <a:schemeClr val="accent6">
+                <a:lumMod val="75000"/>
+              </a:schemeClr>
+            </a:solidFill>
+          </a:ln>
+        </p:spPr>
+        <p:style>
+          <a:lnRef idx="2">
+            <a:schemeClr val="accent1">
+              <a:shade val="50000"/>
+            </a:schemeClr>
+          </a:lnRef>
+          <a:fillRef idx="1">
+            <a:schemeClr val="accent1"/>
+          </a:fillRef>
+          <a:effectRef idx="0">
+            <a:schemeClr val="accent1"/>
+          </a:effectRef>
+          <a:fontRef idx="minor">
+            <a:schemeClr val="lt1"/>
+          </a:fontRef>
+        </p:style>
+        <p:txBody>
+          <a:bodyPr rtlCol="0" anchor="ctr"/>
+          <a:lstStyle/>
+          <a:p>
+            <a:pPr algn="ctr"/>
+            <a:endParaRPr lang="pt-BR"/>
+          </a:p>
+        </p:txBody>
+      </p:sp>
+      <p:pic>
+        <p:nvPicPr>
+          <p:cNvPr id="2054" name="Picture 6" descr="Paleta de cores - ícones de arte e design grátis">
+            <a:extLst>
+              <a:ext uri="{FF2B5EF4-FFF2-40B4-BE49-F238E27FC236}">
+                <a16:creationId xmlns:a16="http://schemas.microsoft.com/office/drawing/2014/main" id="{3B2DAA13-4872-409F-A63A-8106ADA15E07}"/>
+              </a:ext>
+            </a:extLst>
+          </p:cNvPr>
+          <p:cNvPicPr>
+            <a:picLocks noChangeAspect="1" noChangeArrowheads="1"/>
+          </p:cNvPicPr>
+          <p:nvPr/>
+        </p:nvPicPr>
+        <p:blipFill>
+          <a:blip r:embed="rId3">
+            <a:extLst>
+              <a:ext uri="{28A0092B-C50C-407E-A947-70E740481C1C}">
+                <a14:useLocalDpi xmlns:a14="http://schemas.microsoft.com/office/drawing/2010/main" val="0"/>
+              </a:ext>
+            </a:extLst>
+          </a:blip>
+          <a:srcRect/>
+          <a:stretch>
+            <a:fillRect/>
+          </a:stretch>
+        </p:blipFill>
+        <p:spPr bwMode="auto">
+          <a:xfrm>
+            <a:off x="697395" y="2556510"/>
+            <a:ext cx="1714500" cy="1714500"/>
+          </a:xfrm>
+          <a:prstGeom prst="rect">
+            <a:avLst/>
+          </a:prstGeom>
+          <a:noFill/>
+          <a:extLst>
+            <a:ext uri="{909E8E84-426E-40DD-AFC4-6F175D3DCCD1}">
+              <a14:hiddenFill xmlns:a14="http://schemas.microsoft.com/office/drawing/2010/main">
+                <a:solidFill>
+                  <a:srgbClr val="FFFFFF"/>
+                </a:solidFill>
+              </a14:hiddenFill>
+            </a:ext>
+          </a:extLst>
+        </p:spPr>
+      </p:pic>
+    </p:spTree>
+    <p:extLst>
+      <p:ext uri="{BB962C8B-B14F-4D97-AF65-F5344CB8AC3E}">
+        <p14:creationId xmlns:p14="http://schemas.microsoft.com/office/powerpoint/2010/main" val="2232381443"/>
       </p:ext>
     </p:extLst>
   </p:cSld>

</xml_diff>